<commit_message>
Fixed content in presentation
</commit_message>
<xml_diff>
--- a/EcoKey.pptx
+++ b/EcoKey.pptx
@@ -123,6 +123,7 @@
 <file path=ppt/revisionInfo.xml><?xml version="1.0" encoding="utf-8"?>
 <p1510:revInfo xmlns:a="http://schemas.openxmlformats.org/drawingml/2006/main" xmlns:r="http://schemas.openxmlformats.org/officeDocument/2006/relationships" xmlns:p1510="http://schemas.microsoft.com/office/powerpoint/2015/10/main">
   <p1510:revLst>
+    <p1510:client id="{62546B32-6400-EFD4-020A-653C63C4EACE}" v="565" dt="2023-12-05T19:04:40.038"/>
     <p1510:client id="{6D892639-88CC-4BCF-A11C-A8D6ED9B0ACC}" v="3874" dt="2023-12-04T21:12:38.283"/>
   </p1510:revLst>
 </p1510:revInfo>
@@ -259,7 +260,7 @@
           <a:p>
             <a:fld id="{846CE7D5-CF57-46EF-B807-FDD0502418D4}" type="datetimeFigureOut">
               <a:rPr lang="en-GB" smtClean="0"/>
-              <a:t>04/12/2023</a:t>
+              <a:t>05/12/2023</a:t>
             </a:fld>
             <a:endParaRPr lang="en-GB"/>
           </a:p>
@@ -429,7 +430,7 @@
           <a:p>
             <a:fld id="{846CE7D5-CF57-46EF-B807-FDD0502418D4}" type="datetimeFigureOut">
               <a:rPr lang="en-GB" smtClean="0"/>
-              <a:t>04/12/2023</a:t>
+              <a:t>05/12/2023</a:t>
             </a:fld>
             <a:endParaRPr lang="en-GB"/>
           </a:p>
@@ -609,7 +610,7 @@
           <a:p>
             <a:fld id="{846CE7D5-CF57-46EF-B807-FDD0502418D4}" type="datetimeFigureOut">
               <a:rPr lang="en-GB" smtClean="0"/>
-              <a:t>04/12/2023</a:t>
+              <a:t>05/12/2023</a:t>
             </a:fld>
             <a:endParaRPr lang="en-GB"/>
           </a:p>
@@ -779,7 +780,7 @@
           <a:p>
             <a:fld id="{846CE7D5-CF57-46EF-B807-FDD0502418D4}" type="datetimeFigureOut">
               <a:rPr lang="en-GB" smtClean="0"/>
-              <a:t>04/12/2023</a:t>
+              <a:t>05/12/2023</a:t>
             </a:fld>
             <a:endParaRPr lang="en-GB"/>
           </a:p>
@@ -1025,7 +1026,7 @@
           <a:p>
             <a:fld id="{846CE7D5-CF57-46EF-B807-FDD0502418D4}" type="datetimeFigureOut">
               <a:rPr lang="en-GB" smtClean="0"/>
-              <a:t>04/12/2023</a:t>
+              <a:t>05/12/2023</a:t>
             </a:fld>
             <a:endParaRPr lang="en-GB"/>
           </a:p>
@@ -1257,7 +1258,7 @@
           <a:p>
             <a:fld id="{846CE7D5-CF57-46EF-B807-FDD0502418D4}" type="datetimeFigureOut">
               <a:rPr lang="en-GB" smtClean="0"/>
-              <a:t>04/12/2023</a:t>
+              <a:t>05/12/2023</a:t>
             </a:fld>
             <a:endParaRPr lang="en-GB"/>
           </a:p>
@@ -1624,7 +1625,7 @@
           <a:p>
             <a:fld id="{846CE7D5-CF57-46EF-B807-FDD0502418D4}" type="datetimeFigureOut">
               <a:rPr lang="en-GB" smtClean="0"/>
-              <a:t>04/12/2023</a:t>
+              <a:t>05/12/2023</a:t>
             </a:fld>
             <a:endParaRPr lang="en-GB"/>
           </a:p>
@@ -1742,7 +1743,7 @@
           <a:p>
             <a:fld id="{846CE7D5-CF57-46EF-B807-FDD0502418D4}" type="datetimeFigureOut">
               <a:rPr lang="en-GB" smtClean="0"/>
-              <a:t>04/12/2023</a:t>
+              <a:t>05/12/2023</a:t>
             </a:fld>
             <a:endParaRPr lang="en-GB"/>
           </a:p>
@@ -1837,7 +1838,7 @@
           <a:p>
             <a:fld id="{846CE7D5-CF57-46EF-B807-FDD0502418D4}" type="datetimeFigureOut">
               <a:rPr lang="en-GB" smtClean="0"/>
-              <a:t>04/12/2023</a:t>
+              <a:t>05/12/2023</a:t>
             </a:fld>
             <a:endParaRPr lang="en-GB"/>
           </a:p>
@@ -2114,7 +2115,7 @@
           <a:p>
             <a:fld id="{846CE7D5-CF57-46EF-B807-FDD0502418D4}" type="datetimeFigureOut">
               <a:rPr lang="en-GB" smtClean="0"/>
-              <a:t>04/12/2023</a:t>
+              <a:t>05/12/2023</a:t>
             </a:fld>
             <a:endParaRPr lang="en-GB"/>
           </a:p>
@@ -2371,7 +2372,7 @@
           <a:p>
             <a:fld id="{846CE7D5-CF57-46EF-B807-FDD0502418D4}" type="datetimeFigureOut">
               <a:rPr lang="en-GB" smtClean="0"/>
-              <a:t>04/12/2023</a:t>
+              <a:t>05/12/2023</a:t>
             </a:fld>
             <a:endParaRPr lang="en-GB"/>
           </a:p>
@@ -2584,7 +2585,7 @@
           <a:p>
             <a:fld id="{846CE7D5-CF57-46EF-B807-FDD0502418D4}" type="datetimeFigureOut">
               <a:rPr lang="en-GB" smtClean="0"/>
-              <a:t>04/12/2023</a:t>
+              <a:t>05/12/2023</a:t>
             </a:fld>
             <a:endParaRPr lang="en-GB"/>
           </a:p>
@@ -4631,13 +4632,13 @@
   <p:clrMapOvr>
     <a:masterClrMapping/>
   </p:clrMapOvr>
-  <mc:AlternateContent xmlns:mc="http://schemas.openxmlformats.org/markup-compatibility/2006">
-    <mc:Choice xmlns:p159="http://schemas.microsoft.com/office/powerpoint/2015/09/main" Requires="p159">
+  <mc:AlternateContent xmlns:mc="http://schemas.openxmlformats.org/markup-compatibility/2006" xmlns:p159="http://schemas.microsoft.com/office/powerpoint/2015/09/main">
+    <mc:Choice Requires="p159">
       <p:transition xmlns:p14="http://schemas.microsoft.com/office/powerpoint/2010/main" spd="slow" p14:dur="2000">
         <p159:morph option="byObject"/>
       </p:transition>
     </mc:Choice>
-    <mc:Fallback>
+    <mc:Fallback xmlns="">
       <p:transition spd="slow">
         <p:fade/>
       </p:transition>
@@ -6887,13 +6888,13 @@
   <p:clrMapOvr>
     <a:masterClrMapping/>
   </p:clrMapOvr>
-  <mc:AlternateContent xmlns:mc="http://schemas.openxmlformats.org/markup-compatibility/2006">
-    <mc:Choice xmlns:p159="http://schemas.microsoft.com/office/powerpoint/2015/09/main" Requires="p159">
+  <mc:AlternateContent xmlns:mc="http://schemas.openxmlformats.org/markup-compatibility/2006" xmlns:p159="http://schemas.microsoft.com/office/powerpoint/2015/09/main">
+    <mc:Choice Requires="p159">
       <p:transition xmlns:p14="http://schemas.microsoft.com/office/powerpoint/2010/main" spd="slow" p14:dur="2000">
         <p159:morph option="byObject"/>
       </p:transition>
     </mc:Choice>
-    <mc:Fallback>
+    <mc:Fallback xmlns="">
       <p:transition spd="slow">
         <p:fade/>
       </p:transition>
@@ -9120,13 +9121,13 @@
   <p:clrMapOvr>
     <a:masterClrMapping/>
   </p:clrMapOvr>
-  <mc:AlternateContent xmlns:mc="http://schemas.openxmlformats.org/markup-compatibility/2006">
-    <mc:Choice xmlns:p159="http://schemas.microsoft.com/office/powerpoint/2015/09/main" Requires="p159">
+  <mc:AlternateContent xmlns:mc="http://schemas.openxmlformats.org/markup-compatibility/2006" xmlns:p159="http://schemas.microsoft.com/office/powerpoint/2015/09/main">
+    <mc:Choice Requires="p159">
       <p:transition xmlns:p14="http://schemas.microsoft.com/office/powerpoint/2010/main" spd="slow" p14:dur="2000">
         <p159:morph option="byObject"/>
       </p:transition>
     </mc:Choice>
-    <mc:Fallback>
+    <mc:Fallback xmlns="">
       <p:transition spd="slow">
         <p:fade/>
       </p:transition>
@@ -9405,7 +9406,7 @@
         </p:nvSpPr>
         <p:spPr>
           <a:xfrm>
-            <a:off x="10255959" y="2858352"/>
+            <a:off x="10313109" y="2858352"/>
             <a:ext cx="357909" cy="484909"/>
           </a:xfrm>
           <a:prstGeom prst="flowChartOffpageConnector">
@@ -9753,7 +9754,7 @@
         </p:nvSpPr>
         <p:spPr>
           <a:xfrm>
-            <a:off x="3235564" y="1621663"/>
+            <a:off x="3283189" y="1612138"/>
             <a:ext cx="357909" cy="484909"/>
           </a:xfrm>
           <a:prstGeom prst="flowChartOffpageConnector">
@@ -10724,13 +10725,13 @@
   <p:clrMapOvr>
     <a:masterClrMapping/>
   </p:clrMapOvr>
-  <mc:AlternateContent xmlns:mc="http://schemas.openxmlformats.org/markup-compatibility/2006">
-    <mc:Choice xmlns:p159="http://schemas.microsoft.com/office/powerpoint/2015/09/main" Requires="p159">
+  <mc:AlternateContent xmlns:mc="http://schemas.openxmlformats.org/markup-compatibility/2006" xmlns:p159="http://schemas.microsoft.com/office/powerpoint/2015/09/main">
+    <mc:Choice Requires="p159">
       <p:transition xmlns:p14="http://schemas.microsoft.com/office/powerpoint/2010/main" spd="slow" p14:dur="2000">
         <p159:morph option="byObject"/>
       </p:transition>
     </mc:Choice>
-    <mc:Fallback>
+    <mc:Fallback xmlns="">
       <p:transition spd="slow">
         <p:fade/>
       </p:transition>
@@ -11808,13 +11809,13 @@
   <p:clrMapOvr>
     <a:masterClrMapping/>
   </p:clrMapOvr>
-  <mc:AlternateContent xmlns:mc="http://schemas.openxmlformats.org/markup-compatibility/2006">
-    <mc:Choice xmlns:p159="http://schemas.microsoft.com/office/powerpoint/2015/09/main" Requires="p159">
+  <mc:AlternateContent xmlns:mc="http://schemas.openxmlformats.org/markup-compatibility/2006" xmlns:p159="http://schemas.microsoft.com/office/powerpoint/2015/09/main">
+    <mc:Choice Requires="p159">
       <p:transition xmlns:p14="http://schemas.microsoft.com/office/powerpoint/2010/main" spd="slow" p14:dur="2000">
         <p159:morph option="byObject"/>
       </p:transition>
     </mc:Choice>
-    <mc:Fallback>
+    <mc:Fallback xmlns="">
       <p:transition spd="slow">
         <p:fade/>
       </p:transition>
@@ -11840,12 +11841,58 @@
           <a:chExt cx="0" cy="0"/>
         </a:xfrm>
       </p:grpSpPr>
-      <p:sp>
-        <p:nvSpPr>
-          <p:cNvPr id="4" name="TextBox 3">
-            <a:extLst>
-              <a:ext uri="{FF2B5EF4-FFF2-40B4-BE49-F238E27FC236}">
-                <a16:creationId xmlns:a16="http://schemas.microsoft.com/office/drawing/2014/main" id="{00127839-6D1F-FB8E-1DF9-4079CC1EDEF2}"/>
+      <p:pic>
+        <p:nvPicPr>
+          <p:cNvPr id="32" name="Picture 31" descr="A keyboard with green keys&#10;&#10;Description automatically generated">
+            <a:extLst>
+              <a:ext uri="{FF2B5EF4-FFF2-40B4-BE49-F238E27FC236}">
+                <a16:creationId xmlns:a16="http://schemas.microsoft.com/office/drawing/2014/main" id="{F36D4343-BEEF-F19E-6527-2CA352BD2CEF}"/>
+              </a:ext>
+            </a:extLst>
+          </p:cNvPr>
+          <p:cNvPicPr>
+            <a:picLocks noChangeAspect="1"/>
+          </p:cNvPicPr>
+          <p:nvPr/>
+        </p:nvPicPr>
+        <p:blipFill>
+          <a:blip r:embed="rId2"/>
+          <a:stretch>
+            <a:fillRect/>
+          </a:stretch>
+        </p:blipFill>
+        <p:spPr>
+          <a:xfrm>
+            <a:off x="991525" y="7244232"/>
+            <a:ext cx="3018065" cy="2985407"/>
+          </a:xfrm>
+          <a:prstGeom prst="round2DiagRect">
+            <a:avLst>
+              <a:gd name="adj1" fmla="val 16667"/>
+              <a:gd name="adj2" fmla="val 0"/>
+            </a:avLst>
+          </a:prstGeom>
+          <a:ln w="88900" cap="sq">
+            <a:solidFill>
+              <a:srgbClr val="FFFFFF"/>
+            </a:solidFill>
+            <a:miter lim="800000"/>
+          </a:ln>
+          <a:effectLst>
+            <a:outerShdw blurRad="254000" algn="tl" rotWithShape="0">
+              <a:srgbClr val="000000">
+                <a:alpha val="43000"/>
+              </a:srgbClr>
+            </a:outerShdw>
+          </a:effectLst>
+        </p:spPr>
+      </p:pic>
+      <p:sp>
+        <p:nvSpPr>
+          <p:cNvPr id="29" name="TextBox 3">
+            <a:extLst>
+              <a:ext uri="{FF2B5EF4-FFF2-40B4-BE49-F238E27FC236}">
+                <a16:creationId xmlns:a16="http://schemas.microsoft.com/office/drawing/2014/main" id="{F3AEA2FB-9E5C-81D3-1473-75FA5057D4BE}"/>
               </a:ext>
             </a:extLst>
           </p:cNvPr>
@@ -11854,200 +11901,121 @@
         </p:nvSpPr>
         <p:spPr>
           <a:xfrm>
-            <a:off x="2962013" y="-2762390"/>
-            <a:ext cx="7165730" cy="707886"/>
+            <a:off x="5195440" y="7515971"/>
+            <a:ext cx="6647260" cy="2677656"/>
           </a:xfrm>
           <a:prstGeom prst="rect">
             <a:avLst/>
           </a:prstGeom>
           <a:noFill/>
-        </p:spPr>
-        <p:txBody>
-          <a:bodyPr rot="0" spcFirstLastPara="0" vertOverflow="overflow" horzOverflow="overflow" vert="horz" wrap="square" lIns="91440" tIns="45720" rIns="91440" bIns="45720" numCol="1" spcCol="0" rtlCol="0" fromWordArt="0" anchor="t" anchorCtr="0" forceAA="0" compatLnSpc="1">
+          <a:ln w="28575">
+            <a:solidFill>
+              <a:schemeClr val="tx1"/>
+            </a:solidFill>
+          </a:ln>
+        </p:spPr>
+        <p:txBody>
+          <a:bodyPr rot="0" spcFirstLastPara="0" vert="horz" wrap="square" lIns="91440" tIns="45720" rIns="91440" bIns="45720" numCol="1" spcCol="0" rtlCol="0" fromWordArt="0" anchor="t" anchorCtr="0" forceAA="0" compatLnSpc="1">
             <a:prstTxWarp prst="textNoShape">
               <a:avLst/>
             </a:prstTxWarp>
             <a:spAutoFit/>
           </a:bodyPr>
-          <a:lstStyle/>
-          <a:p>
-            <a:pPr algn="ctr"/>
-            <a:r>
-              <a:rPr lang="en-GB" sz="4000" b="1" dirty="0">
-                <a:cs typeface="Calibri"/>
-              </a:rPr>
-              <a:t>Stages of Development</a:t>
-            </a:r>
-          </a:p>
-        </p:txBody>
-      </p:sp>
-      <p:sp>
-        <p:nvSpPr>
-          <p:cNvPr id="6" name="TextBox 5">
-            <a:extLst>
-              <a:ext uri="{FF2B5EF4-FFF2-40B4-BE49-F238E27FC236}">
-                <a16:creationId xmlns:a16="http://schemas.microsoft.com/office/drawing/2014/main" id="{0E48037F-931C-E7F6-465D-E2D1F82B3B14}"/>
-              </a:ext>
-            </a:extLst>
-          </p:cNvPr>
-          <p:cNvSpPr txBox="1"/>
-          <p:nvPr/>
-        </p:nvSpPr>
-        <p:spPr>
-          <a:xfrm>
-            <a:off x="13739211" y="1532207"/>
-            <a:ext cx="9281602" cy="1200329"/>
-          </a:xfrm>
-          <a:prstGeom prst="rect">
-            <a:avLst/>
-          </a:prstGeom>
-          <a:noFill/>
-          <a:ln w="28575">
-            <a:solidFill>
-              <a:schemeClr val="tx1"/>
-            </a:solidFill>
-          </a:ln>
-        </p:spPr>
-        <p:txBody>
-          <a:bodyPr rot="0" spcFirstLastPara="0" vertOverflow="overflow" horzOverflow="overflow" vert="horz" wrap="square" lIns="91440" tIns="45720" rIns="91440" bIns="45720" numCol="1" spcCol="0" rtlCol="0" fromWordArt="0" anchor="t" anchorCtr="0" forceAA="0" compatLnSpc="1">
-            <a:prstTxWarp prst="textNoShape">
-              <a:avLst/>
-            </a:prstTxWarp>
-            <a:spAutoFit/>
-          </a:bodyPr>
-          <a:lstStyle/>
-          <a:p>
-            <a:r>
-              <a:rPr lang="en-GB" sz="2400" b="1" dirty="0">
+          <a:lstStyle>
+            <a:defPPr>
+              <a:defRPr lang="en-GB"/>
+            </a:defPPr>
+            <a:lvl1pPr marL="0" algn="l" defTabSz="914400" rtl="0" eaLnBrk="1" latinLnBrk="0" hangingPunct="1">
+              <a:defRPr sz="1800" kern="1200">
                 <a:solidFill>
-                  <a:srgbClr val="749074"/>
+                  <a:schemeClr val="tx1"/>
                 </a:solidFill>
-                <a:cs typeface="Calibri"/>
-              </a:rPr>
-              <a:t>Planning and Research</a:t>
-            </a:r>
-            <a:r>
-              <a:rPr lang="en-GB" sz="2400" b="1" dirty="0">
-                <a:cs typeface="Calibri"/>
-              </a:rPr>
-              <a:t>: </a:t>
-            </a:r>
-          </a:p>
-          <a:p>
-            <a:r>
-              <a:rPr lang="en-GB" sz="2400" dirty="0">
-                <a:cs typeface="Calibri"/>
-              </a:rPr>
-              <a:t>Defining the goals of the website - to inform, inspire and mobilize users.</a:t>
-            </a:r>
-            <a:endParaRPr lang="en-GB" sz="2400">
-              <a:cs typeface="Calibri" panose="020F0502020204030204"/>
-            </a:endParaRPr>
-          </a:p>
-          <a:p>
-            <a:r>
-              <a:rPr lang="en-GB" sz="2400" dirty="0">
-                <a:cs typeface="Calibri"/>
-              </a:rPr>
-              <a:t>Exploring the most effective ways to present environmental information.</a:t>
-            </a:r>
-            <a:endParaRPr lang="en-GB" sz="2400" dirty="0"/>
-          </a:p>
-        </p:txBody>
-      </p:sp>
-      <p:sp>
-        <p:nvSpPr>
-          <p:cNvPr id="18" name="Flowchart: Off-page Connector 17">
-            <a:extLst>
-              <a:ext uri="{FF2B5EF4-FFF2-40B4-BE49-F238E27FC236}">
-                <a16:creationId xmlns:a16="http://schemas.microsoft.com/office/drawing/2014/main" id="{7AA2B67F-79CC-2514-2E2D-2385FFC494F3}"/>
-              </a:ext>
-            </a:extLst>
-          </p:cNvPr>
-          <p:cNvSpPr/>
-          <p:nvPr/>
-        </p:nvSpPr>
-        <p:spPr>
-          <a:xfrm>
-            <a:off x="13068777" y="1533782"/>
-            <a:ext cx="463554" cy="495794"/>
-          </a:xfrm>
-          <a:prstGeom prst="flowChartOffpageConnector">
-            <a:avLst/>
-          </a:prstGeom>
-          <a:solidFill>
-            <a:srgbClr val="749074"/>
-          </a:solidFill>
-          <a:ln w="12700">
-            <a:noFill/>
-          </a:ln>
-        </p:spPr>
-        <p:style>
-          <a:lnRef idx="2">
-            <a:schemeClr val="accent1">
-              <a:shade val="15000"/>
-            </a:schemeClr>
-          </a:lnRef>
-          <a:fillRef idx="1">
-            <a:schemeClr val="accent1"/>
-          </a:fillRef>
-          <a:effectRef idx="0">
-            <a:schemeClr val="accent1"/>
-          </a:effectRef>
-          <a:fontRef idx="minor">
-            <a:schemeClr val="lt1"/>
-          </a:fontRef>
-        </p:style>
-        <p:txBody>
-          <a:bodyPr lIns="91440" tIns="45720" rIns="91440" bIns="45720" rtlCol="0" anchor="ctr"/>
-          <a:lstStyle/>
-          <a:p>
-            <a:pPr algn="ctr"/>
-            <a:r>
-              <a:rPr lang="en-GB" b="1" dirty="0">
-                <a:cs typeface="Calibri"/>
-              </a:rPr>
-              <a:t>1.</a:t>
-            </a:r>
-            <a:endParaRPr lang="en-GB" b="1" dirty="0"/>
-          </a:p>
-        </p:txBody>
-      </p:sp>
-      <p:sp>
-        <p:nvSpPr>
-          <p:cNvPr id="22" name="TextBox 21">
-            <a:extLst>
-              <a:ext uri="{FF2B5EF4-FFF2-40B4-BE49-F238E27FC236}">
-                <a16:creationId xmlns:a16="http://schemas.microsoft.com/office/drawing/2014/main" id="{71070A1C-EFD8-0051-14D5-4F8D3E8D944E}"/>
-              </a:ext>
-            </a:extLst>
-          </p:cNvPr>
-          <p:cNvSpPr txBox="1"/>
-          <p:nvPr/>
-        </p:nvSpPr>
-        <p:spPr>
-          <a:xfrm>
-            <a:off x="5054670" y="7604381"/>
-            <a:ext cx="6647260" cy="1569660"/>
-          </a:xfrm>
-          <a:prstGeom prst="rect">
-            <a:avLst/>
-          </a:prstGeom>
-          <a:noFill/>
-          <a:ln w="28575">
-            <a:solidFill>
-              <a:schemeClr val="tx1"/>
-            </a:solidFill>
-          </a:ln>
-        </p:spPr>
-        <p:txBody>
-          <a:bodyPr rot="0" spcFirstLastPara="0" vertOverflow="overflow" horzOverflow="overflow" vert="horz" wrap="square" lIns="91440" tIns="45720" rIns="91440" bIns="45720" numCol="1" spcCol="0" rtlCol="0" fromWordArt="0" anchor="t" anchorCtr="0" forceAA="0" compatLnSpc="1">
-            <a:prstTxWarp prst="textNoShape">
-              <a:avLst/>
-            </a:prstTxWarp>
-            <a:spAutoFit/>
-          </a:bodyPr>
-          <a:lstStyle/>
+                <a:latin typeface="+mn-lt"/>
+                <a:ea typeface="+mn-ea"/>
+                <a:cs typeface="+mn-cs"/>
+              </a:defRPr>
+            </a:lvl1pPr>
+            <a:lvl2pPr marL="457200" algn="l" defTabSz="914400" rtl="0" eaLnBrk="1" latinLnBrk="0" hangingPunct="1">
+              <a:defRPr sz="1800" kern="1200">
+                <a:solidFill>
+                  <a:schemeClr val="tx1"/>
+                </a:solidFill>
+                <a:latin typeface="+mn-lt"/>
+                <a:ea typeface="+mn-ea"/>
+                <a:cs typeface="+mn-cs"/>
+              </a:defRPr>
+            </a:lvl2pPr>
+            <a:lvl3pPr marL="914400" algn="l" defTabSz="914400" rtl="0" eaLnBrk="1" latinLnBrk="0" hangingPunct="1">
+              <a:defRPr sz="1800" kern="1200">
+                <a:solidFill>
+                  <a:schemeClr val="tx1"/>
+                </a:solidFill>
+                <a:latin typeface="+mn-lt"/>
+                <a:ea typeface="+mn-ea"/>
+                <a:cs typeface="+mn-cs"/>
+              </a:defRPr>
+            </a:lvl3pPr>
+            <a:lvl4pPr marL="1371600" algn="l" defTabSz="914400" rtl="0" eaLnBrk="1" latinLnBrk="0" hangingPunct="1">
+              <a:defRPr sz="1800" kern="1200">
+                <a:solidFill>
+                  <a:schemeClr val="tx1"/>
+                </a:solidFill>
+                <a:latin typeface="+mn-lt"/>
+                <a:ea typeface="+mn-ea"/>
+                <a:cs typeface="+mn-cs"/>
+              </a:defRPr>
+            </a:lvl4pPr>
+            <a:lvl5pPr marL="1828800" algn="l" defTabSz="914400" rtl="0" eaLnBrk="1" latinLnBrk="0" hangingPunct="1">
+              <a:defRPr sz="1800" kern="1200">
+                <a:solidFill>
+                  <a:schemeClr val="tx1"/>
+                </a:solidFill>
+                <a:latin typeface="+mn-lt"/>
+                <a:ea typeface="+mn-ea"/>
+                <a:cs typeface="+mn-cs"/>
+              </a:defRPr>
+            </a:lvl5pPr>
+            <a:lvl6pPr marL="2286000" algn="l" defTabSz="914400" rtl="0" eaLnBrk="1" latinLnBrk="0" hangingPunct="1">
+              <a:defRPr sz="1800" kern="1200">
+                <a:solidFill>
+                  <a:schemeClr val="tx1"/>
+                </a:solidFill>
+                <a:latin typeface="+mn-lt"/>
+                <a:ea typeface="+mn-ea"/>
+                <a:cs typeface="+mn-cs"/>
+              </a:defRPr>
+            </a:lvl6pPr>
+            <a:lvl7pPr marL="2743200" algn="l" defTabSz="914400" rtl="0" eaLnBrk="1" latinLnBrk="0" hangingPunct="1">
+              <a:defRPr sz="1800" kern="1200">
+                <a:solidFill>
+                  <a:schemeClr val="tx1"/>
+                </a:solidFill>
+                <a:latin typeface="+mn-lt"/>
+                <a:ea typeface="+mn-ea"/>
+                <a:cs typeface="+mn-cs"/>
+              </a:defRPr>
+            </a:lvl7pPr>
+            <a:lvl8pPr marL="3200400" algn="l" defTabSz="914400" rtl="0" eaLnBrk="1" latinLnBrk="0" hangingPunct="1">
+              <a:defRPr sz="1800" kern="1200">
+                <a:solidFill>
+                  <a:schemeClr val="tx1"/>
+                </a:solidFill>
+                <a:latin typeface="+mn-lt"/>
+                <a:ea typeface="+mn-ea"/>
+                <a:cs typeface="+mn-cs"/>
+              </a:defRPr>
+            </a:lvl8pPr>
+            <a:lvl9pPr marL="3657600" algn="l" defTabSz="914400" rtl="0" eaLnBrk="1" latinLnBrk="0" hangingPunct="1">
+              <a:defRPr sz="1800" kern="1200">
+                <a:solidFill>
+                  <a:schemeClr val="tx1"/>
+                </a:solidFill>
+                <a:latin typeface="+mn-lt"/>
+                <a:ea typeface="+mn-ea"/>
+                <a:cs typeface="+mn-cs"/>
+              </a:defRPr>
+            </a:lvl9pPr>
+          </a:lstStyle>
           <a:p>
             <a:r>
               <a:rPr lang="en-GB" sz="2400" b="1" dirty="0">
@@ -12075,21 +12043,60 @@
                 <a:ea typeface="+mn-lt"/>
                 <a:cs typeface="+mn-lt"/>
               </a:rPr>
-              <a:t>Using tools like Figma to create an aesthetic and user-friendly design. The designer shares design information with teammates.</a:t>
+              <a:t>The </a:t>
             </a:r>
-            <a:endParaRPr lang="en-GB" dirty="0">
-              <a:ea typeface="+mn-lt"/>
-              <a:cs typeface="+mn-lt"/>
-            </a:endParaRPr>
-          </a:p>
-        </p:txBody>
-      </p:sp>
-      <p:sp>
-        <p:nvSpPr>
-          <p:cNvPr id="24" name="Flowchart: Off-page Connector 23">
-            <a:extLst>
-              <a:ext uri="{FF2B5EF4-FFF2-40B4-BE49-F238E27FC236}">
-                <a16:creationId xmlns:a16="http://schemas.microsoft.com/office/drawing/2014/main" id="{DCFAA026-6F4F-C914-DB2E-8BF1B678C27B}"/>
+            <a:r>
+              <a:rPr lang="en-GB" sz="2400" dirty="0" err="1">
+                <a:ea typeface="+mn-lt"/>
+                <a:cs typeface="+mn-lt"/>
+              </a:rPr>
+              <a:t>desinger</a:t>
+            </a:r>
+            <a:r>
+              <a:rPr lang="en-GB" sz="2400" dirty="0">
+                <a:ea typeface="+mn-lt"/>
+                <a:cs typeface="+mn-lt"/>
+              </a:rPr>
+              <a:t> took care of defining the </a:t>
+            </a:r>
+            <a:r>
+              <a:rPr lang="en-GB" sz="2400" dirty="0" err="1">
+                <a:ea typeface="+mn-lt"/>
+                <a:cs typeface="+mn-lt"/>
+              </a:rPr>
+              <a:t>color</a:t>
+            </a:r>
+            <a:r>
+              <a:rPr lang="en-GB" sz="2400" dirty="0">
+                <a:ea typeface="+mn-lt"/>
+                <a:cs typeface="+mn-lt"/>
+              </a:rPr>
+              <a:t> scheme, working closely with the team and commenting on the author's elements with the team. Determine the font and </a:t>
+            </a:r>
+            <a:r>
+              <a:rPr lang="en-GB" sz="2400" dirty="0" err="1">
+                <a:ea typeface="+mn-lt"/>
+                <a:cs typeface="+mn-lt"/>
+              </a:rPr>
+              <a:t>color</a:t>
+            </a:r>
+            <a:r>
+              <a:rPr lang="en-GB" sz="2400" dirty="0">
+                <a:ea typeface="+mn-lt"/>
+                <a:cs typeface="+mn-lt"/>
+              </a:rPr>
+              <a:t> norms of the site. Select the content of the site, dealing directly with the topic.</a:t>
+            </a:r>
+            <a:endParaRPr lang="en-GB" dirty="0"/>
+          </a:p>
+        </p:txBody>
+      </p:sp>
+      <p:sp>
+        <p:nvSpPr>
+          <p:cNvPr id="30" name="Flowchart: Off-page Connector 29">
+            <a:extLst>
+              <a:ext uri="{FF2B5EF4-FFF2-40B4-BE49-F238E27FC236}">
+                <a16:creationId xmlns:a16="http://schemas.microsoft.com/office/drawing/2014/main" id="{536DC92E-6CFA-833B-1E55-2101DB2180DC}"/>
               </a:ext>
             </a:extLst>
           </p:cNvPr>
@@ -12098,7 +12105,7 @@
         </p:nvSpPr>
         <p:spPr>
           <a:xfrm>
-            <a:off x="4416893" y="7605957"/>
+            <a:off x="4580408" y="7551667"/>
             <a:ext cx="463554" cy="495794"/>
           </a:xfrm>
           <a:prstGeom prst="flowChartOffpageConnector">
@@ -12129,7 +12136,101 @@
         </p:style>
         <p:txBody>
           <a:bodyPr lIns="91440" tIns="45720" rIns="91440" bIns="45720" rtlCol="0" anchor="ctr"/>
-          <a:lstStyle/>
+          <a:lstStyle>
+            <a:defPPr>
+              <a:defRPr lang="en-GB"/>
+            </a:defPPr>
+            <a:lvl1pPr marL="0" algn="l" defTabSz="914400" rtl="0" eaLnBrk="1" latinLnBrk="0" hangingPunct="1">
+              <a:defRPr sz="1800" kern="1200">
+                <a:solidFill>
+                  <a:schemeClr val="lt1"/>
+                </a:solidFill>
+                <a:latin typeface="+mn-lt"/>
+                <a:ea typeface="+mn-ea"/>
+                <a:cs typeface="+mn-cs"/>
+              </a:defRPr>
+            </a:lvl1pPr>
+            <a:lvl2pPr marL="457200" algn="l" defTabSz="914400" rtl="0" eaLnBrk="1" latinLnBrk="0" hangingPunct="1">
+              <a:defRPr sz="1800" kern="1200">
+                <a:solidFill>
+                  <a:schemeClr val="lt1"/>
+                </a:solidFill>
+                <a:latin typeface="+mn-lt"/>
+                <a:ea typeface="+mn-ea"/>
+                <a:cs typeface="+mn-cs"/>
+              </a:defRPr>
+            </a:lvl2pPr>
+            <a:lvl3pPr marL="914400" algn="l" defTabSz="914400" rtl="0" eaLnBrk="1" latinLnBrk="0" hangingPunct="1">
+              <a:defRPr sz="1800" kern="1200">
+                <a:solidFill>
+                  <a:schemeClr val="lt1"/>
+                </a:solidFill>
+                <a:latin typeface="+mn-lt"/>
+                <a:ea typeface="+mn-ea"/>
+                <a:cs typeface="+mn-cs"/>
+              </a:defRPr>
+            </a:lvl3pPr>
+            <a:lvl4pPr marL="1371600" algn="l" defTabSz="914400" rtl="0" eaLnBrk="1" latinLnBrk="0" hangingPunct="1">
+              <a:defRPr sz="1800" kern="1200">
+                <a:solidFill>
+                  <a:schemeClr val="lt1"/>
+                </a:solidFill>
+                <a:latin typeface="+mn-lt"/>
+                <a:ea typeface="+mn-ea"/>
+                <a:cs typeface="+mn-cs"/>
+              </a:defRPr>
+            </a:lvl4pPr>
+            <a:lvl5pPr marL="1828800" algn="l" defTabSz="914400" rtl="0" eaLnBrk="1" latinLnBrk="0" hangingPunct="1">
+              <a:defRPr sz="1800" kern="1200">
+                <a:solidFill>
+                  <a:schemeClr val="lt1"/>
+                </a:solidFill>
+                <a:latin typeface="+mn-lt"/>
+                <a:ea typeface="+mn-ea"/>
+                <a:cs typeface="+mn-cs"/>
+              </a:defRPr>
+            </a:lvl5pPr>
+            <a:lvl6pPr marL="2286000" algn="l" defTabSz="914400" rtl="0" eaLnBrk="1" latinLnBrk="0" hangingPunct="1">
+              <a:defRPr sz="1800" kern="1200">
+                <a:solidFill>
+                  <a:schemeClr val="lt1"/>
+                </a:solidFill>
+                <a:latin typeface="+mn-lt"/>
+                <a:ea typeface="+mn-ea"/>
+                <a:cs typeface="+mn-cs"/>
+              </a:defRPr>
+            </a:lvl6pPr>
+            <a:lvl7pPr marL="2743200" algn="l" defTabSz="914400" rtl="0" eaLnBrk="1" latinLnBrk="0" hangingPunct="1">
+              <a:defRPr sz="1800" kern="1200">
+                <a:solidFill>
+                  <a:schemeClr val="lt1"/>
+                </a:solidFill>
+                <a:latin typeface="+mn-lt"/>
+                <a:ea typeface="+mn-ea"/>
+                <a:cs typeface="+mn-cs"/>
+              </a:defRPr>
+            </a:lvl7pPr>
+            <a:lvl8pPr marL="3200400" algn="l" defTabSz="914400" rtl="0" eaLnBrk="1" latinLnBrk="0" hangingPunct="1">
+              <a:defRPr sz="1800" kern="1200">
+                <a:solidFill>
+                  <a:schemeClr val="lt1"/>
+                </a:solidFill>
+                <a:latin typeface="+mn-lt"/>
+                <a:ea typeface="+mn-ea"/>
+                <a:cs typeface="+mn-cs"/>
+              </a:defRPr>
+            </a:lvl8pPr>
+            <a:lvl9pPr marL="3657600" algn="l" defTabSz="914400" rtl="0" eaLnBrk="1" latinLnBrk="0" hangingPunct="1">
+              <a:defRPr sz="1800" kern="1200">
+                <a:solidFill>
+                  <a:schemeClr val="lt1"/>
+                </a:solidFill>
+                <a:latin typeface="+mn-lt"/>
+                <a:ea typeface="+mn-ea"/>
+                <a:cs typeface="+mn-cs"/>
+              </a:defRPr>
+            </a:lvl9pPr>
+          </a:lstStyle>
           <a:p>
             <a:pPr algn="ctr"/>
             <a:r>
@@ -12142,52 +12243,172 @@
           </a:p>
         </p:txBody>
       </p:sp>
-      <p:pic>
-        <p:nvPicPr>
-          <p:cNvPr id="26" name="Picture 25" descr="A keyboard with green keys&#10;&#10;Description automatically generated">
-            <a:extLst>
-              <a:ext uri="{FF2B5EF4-FFF2-40B4-BE49-F238E27FC236}">
-                <a16:creationId xmlns:a16="http://schemas.microsoft.com/office/drawing/2014/main" id="{534EA5ED-44E3-5A70-89B1-7F3073D5F19B}"/>
-              </a:ext>
-            </a:extLst>
-          </p:cNvPr>
-          <p:cNvPicPr>
-            <a:picLocks noChangeAspect="1"/>
-          </p:cNvPicPr>
-          <p:nvPr/>
-        </p:nvPicPr>
-        <p:blipFill>
-          <a:blip r:embed="rId2"/>
-          <a:stretch>
-            <a:fillRect/>
-          </a:stretch>
-        </p:blipFill>
-        <p:spPr>
-          <a:xfrm>
-            <a:off x="918994" y="9448260"/>
-            <a:ext cx="3018065" cy="2985407"/>
-          </a:xfrm>
-          <a:prstGeom prst="round2DiagRect">
-            <a:avLst>
-              <a:gd name="adj1" fmla="val 16667"/>
-              <a:gd name="adj2" fmla="val 0"/>
-            </a:avLst>
-          </a:prstGeom>
-          <a:ln w="88900" cap="sq">
-            <a:solidFill>
-              <a:srgbClr val="FFFFFF"/>
-            </a:solidFill>
-            <a:miter lim="800000"/>
-          </a:ln>
-          <a:effectLst>
-            <a:outerShdw blurRad="254000" algn="tl" rotWithShape="0">
-              <a:srgbClr val="000000">
-                <a:alpha val="43000"/>
-              </a:srgbClr>
-            </a:outerShdw>
-          </a:effectLst>
-        </p:spPr>
-      </p:pic>
+      <p:sp>
+        <p:nvSpPr>
+          <p:cNvPr id="5" name="TextBox 4">
+            <a:extLst>
+              <a:ext uri="{FF2B5EF4-FFF2-40B4-BE49-F238E27FC236}">
+                <a16:creationId xmlns:a16="http://schemas.microsoft.com/office/drawing/2014/main" id="{F1D41245-A002-23D2-7885-F4E06ED6349B}"/>
+              </a:ext>
+            </a:extLst>
+          </p:cNvPr>
+          <p:cNvSpPr txBox="1"/>
+          <p:nvPr/>
+        </p:nvSpPr>
+        <p:spPr>
+          <a:xfrm>
+            <a:off x="13143731" y="1226848"/>
+            <a:ext cx="9281602" cy="1938992"/>
+          </a:xfrm>
+          <a:prstGeom prst="rect">
+            <a:avLst/>
+          </a:prstGeom>
+          <a:noFill/>
+          <a:ln w="28575">
+            <a:solidFill>
+              <a:schemeClr val="tx1"/>
+            </a:solidFill>
+          </a:ln>
+        </p:spPr>
+        <p:txBody>
+          <a:bodyPr rot="0" spcFirstLastPara="0" vertOverflow="overflow" horzOverflow="overflow" vert="horz" wrap="square" lIns="91440" tIns="45720" rIns="91440" bIns="45720" numCol="1" spcCol="0" rtlCol="0" fromWordArt="0" anchor="t" anchorCtr="0" forceAA="0" compatLnSpc="1">
+            <a:prstTxWarp prst="textNoShape">
+              <a:avLst/>
+            </a:prstTxWarp>
+            <a:spAutoFit/>
+          </a:bodyPr>
+          <a:lstStyle/>
+          <a:p>
+            <a:r>
+              <a:rPr lang="en-GB" sz="2400" b="1" dirty="0">
+                <a:solidFill>
+                  <a:srgbClr val="749074"/>
+                </a:solidFill>
+                <a:cs typeface="Calibri"/>
+              </a:rPr>
+              <a:t>Planning and Research</a:t>
+            </a:r>
+            <a:r>
+              <a:rPr lang="en-GB" sz="2400" b="1" dirty="0">
+                <a:cs typeface="Calibri"/>
+              </a:rPr>
+              <a:t>: </a:t>
+            </a:r>
+          </a:p>
+          <a:p>
+            <a:r>
+              <a:rPr lang="en-GB" sz="2400" dirty="0">
+                <a:ea typeface="+mn-lt"/>
+                <a:cs typeface="+mn-lt"/>
+              </a:rPr>
+              <a:t>The team leader organized team meetings in the Discord app and together with the team determined the topic, following the strictly defined requirements described in the project documentation. They made the logo together and commented on the stage of work.</a:t>
+            </a:r>
+            <a:endParaRPr lang="en-GB" dirty="0">
+              <a:ea typeface="+mn-lt"/>
+              <a:cs typeface="+mn-lt"/>
+            </a:endParaRPr>
+          </a:p>
+        </p:txBody>
+      </p:sp>
+      <p:sp>
+        <p:nvSpPr>
+          <p:cNvPr id="11" name="Flowchart: Off-page Connector 10">
+            <a:extLst>
+              <a:ext uri="{FF2B5EF4-FFF2-40B4-BE49-F238E27FC236}">
+                <a16:creationId xmlns:a16="http://schemas.microsoft.com/office/drawing/2014/main" id="{EBC88CB3-A2BA-FE90-90C0-63C83C0E11AA}"/>
+              </a:ext>
+            </a:extLst>
+          </p:cNvPr>
+          <p:cNvSpPr/>
+          <p:nvPr/>
+        </p:nvSpPr>
+        <p:spPr>
+          <a:xfrm>
+            <a:off x="12541536" y="1239798"/>
+            <a:ext cx="463554" cy="495794"/>
+          </a:xfrm>
+          <a:prstGeom prst="flowChartOffpageConnector">
+            <a:avLst/>
+          </a:prstGeom>
+          <a:solidFill>
+            <a:srgbClr val="749074"/>
+          </a:solidFill>
+          <a:ln w="12700">
+            <a:noFill/>
+          </a:ln>
+        </p:spPr>
+        <p:style>
+          <a:lnRef idx="2">
+            <a:schemeClr val="accent1">
+              <a:shade val="15000"/>
+            </a:schemeClr>
+          </a:lnRef>
+          <a:fillRef idx="1">
+            <a:schemeClr val="accent1"/>
+          </a:fillRef>
+          <a:effectRef idx="0">
+            <a:schemeClr val="accent1"/>
+          </a:effectRef>
+          <a:fontRef idx="minor">
+            <a:schemeClr val="lt1"/>
+          </a:fontRef>
+        </p:style>
+        <p:txBody>
+          <a:bodyPr lIns="91440" tIns="45720" rIns="91440" bIns="45720" rtlCol="0" anchor="ctr"/>
+          <a:lstStyle/>
+          <a:p>
+            <a:pPr algn="ctr"/>
+            <a:r>
+              <a:rPr lang="en-GB" b="1" dirty="0">
+                <a:cs typeface="Calibri"/>
+              </a:rPr>
+              <a:t>1.</a:t>
+            </a:r>
+            <a:endParaRPr lang="en-GB" b="1" dirty="0"/>
+          </a:p>
+        </p:txBody>
+      </p:sp>
+      <p:sp>
+        <p:nvSpPr>
+          <p:cNvPr id="4" name="TextBox 3">
+            <a:extLst>
+              <a:ext uri="{FF2B5EF4-FFF2-40B4-BE49-F238E27FC236}">
+                <a16:creationId xmlns:a16="http://schemas.microsoft.com/office/drawing/2014/main" id="{00127839-6D1F-FB8E-1DF9-4079CC1EDEF2}"/>
+              </a:ext>
+            </a:extLst>
+          </p:cNvPr>
+          <p:cNvSpPr txBox="1"/>
+          <p:nvPr/>
+        </p:nvSpPr>
+        <p:spPr>
+          <a:xfrm>
+            <a:off x="2962013" y="-2762390"/>
+            <a:ext cx="7165730" cy="707886"/>
+          </a:xfrm>
+          <a:prstGeom prst="rect">
+            <a:avLst/>
+          </a:prstGeom>
+          <a:noFill/>
+        </p:spPr>
+        <p:txBody>
+          <a:bodyPr rot="0" spcFirstLastPara="0" vertOverflow="overflow" horzOverflow="overflow" vert="horz" wrap="square" lIns="91440" tIns="45720" rIns="91440" bIns="45720" numCol="1" spcCol="0" rtlCol="0" fromWordArt="0" anchor="t" anchorCtr="0" forceAA="0" compatLnSpc="1">
+            <a:prstTxWarp prst="textNoShape">
+              <a:avLst/>
+            </a:prstTxWarp>
+            <a:spAutoFit/>
+          </a:bodyPr>
+          <a:lstStyle/>
+          <a:p>
+            <a:pPr algn="ctr"/>
+            <a:r>
+              <a:rPr lang="en-GB" sz="4000" b="1" dirty="0">
+                <a:cs typeface="Calibri"/>
+              </a:rPr>
+              <a:t>Stages of Development</a:t>
+            </a:r>
+          </a:p>
+        </p:txBody>
+      </p:sp>
       <p:sp>
         <p:nvSpPr>
           <p:cNvPr id="50" name="TextBox 49">
@@ -12839,13 +13060,13 @@
   <p:clrMapOvr>
     <a:masterClrMapping/>
   </p:clrMapOvr>
-  <mc:AlternateContent xmlns:mc="http://schemas.openxmlformats.org/markup-compatibility/2006">
-    <mc:Choice xmlns:p159="http://schemas.microsoft.com/office/powerpoint/2015/09/main" Requires="p159">
+  <mc:AlternateContent xmlns:mc="http://schemas.openxmlformats.org/markup-compatibility/2006" xmlns:p159="http://schemas.microsoft.com/office/powerpoint/2015/09/main">
+    <mc:Choice Requires="p159">
       <p:transition xmlns:p14="http://schemas.microsoft.com/office/powerpoint/2010/main" spd="slow" p14:dur="2000">
         <p159:morph option="byObject"/>
       </p:transition>
     </mc:Choice>
-    <mc:Fallback>
+    <mc:Fallback xmlns="">
       <p:transition spd="slow">
         <p:fade/>
       </p:transition>
@@ -12873,68 +13094,10 @@
       </p:grpSpPr>
       <p:sp>
         <p:nvSpPr>
-          <p:cNvPr id="22" name="Flowchart: Off-page Connector 21">
-            <a:extLst>
-              <a:ext uri="{FF2B5EF4-FFF2-40B4-BE49-F238E27FC236}">
-                <a16:creationId xmlns:a16="http://schemas.microsoft.com/office/drawing/2014/main" id="{422B0E66-C437-FE73-D1E2-FCD824951441}"/>
-              </a:ext>
-            </a:extLst>
-          </p:cNvPr>
-          <p:cNvSpPr/>
-          <p:nvPr/>
-        </p:nvSpPr>
-        <p:spPr>
-          <a:xfrm>
-            <a:off x="-1931326" y="1583898"/>
-            <a:ext cx="463554" cy="495794"/>
-          </a:xfrm>
-          <a:prstGeom prst="flowChartOffpageConnector">
-            <a:avLst/>
-          </a:prstGeom>
-          <a:solidFill>
-            <a:srgbClr val="749074"/>
-          </a:solidFill>
-          <a:ln w="12700">
-            <a:noFill/>
-          </a:ln>
-        </p:spPr>
-        <p:style>
-          <a:lnRef idx="2">
-            <a:schemeClr val="accent1">
-              <a:shade val="15000"/>
-            </a:schemeClr>
-          </a:lnRef>
-          <a:fillRef idx="1">
-            <a:schemeClr val="accent1"/>
-          </a:fillRef>
-          <a:effectRef idx="0">
-            <a:schemeClr val="accent1"/>
-          </a:effectRef>
-          <a:fontRef idx="minor">
-            <a:schemeClr val="lt1"/>
-          </a:fontRef>
-        </p:style>
-        <p:txBody>
-          <a:bodyPr lIns="91440" tIns="45720" rIns="91440" bIns="45720" rtlCol="0" anchor="ctr"/>
-          <a:lstStyle/>
-          <a:p>
-            <a:pPr algn="ctr"/>
-            <a:r>
-              <a:rPr lang="en-GB" b="1" dirty="0">
-                <a:cs typeface="Calibri"/>
-              </a:rPr>
-              <a:t>3.</a:t>
-            </a:r>
-            <a:endParaRPr lang="en-GB" b="1" dirty="0"/>
-          </a:p>
-        </p:txBody>
-      </p:sp>
-      <p:sp>
-        <p:nvSpPr>
-          <p:cNvPr id="24" name="TextBox 23">
-            <a:extLst>
-              <a:ext uri="{FF2B5EF4-FFF2-40B4-BE49-F238E27FC236}">
-                <a16:creationId xmlns:a16="http://schemas.microsoft.com/office/drawing/2014/main" id="{DBC52FEC-05B5-922F-8BD0-556FE7349A7C}"/>
+          <p:cNvPr id="6" name="TextBox 5">
+            <a:extLst>
+              <a:ext uri="{FF2B5EF4-FFF2-40B4-BE49-F238E27FC236}">
+                <a16:creationId xmlns:a16="http://schemas.microsoft.com/office/drawing/2014/main" id="{6C2C4565-60B5-F54A-AD85-36350B20D226}"/>
               </a:ext>
             </a:extLst>
           </p:cNvPr>
@@ -12943,8 +13106,8 @@
         </p:nvSpPr>
         <p:spPr>
           <a:xfrm>
-            <a:off x="1974013" y="7362020"/>
-            <a:ext cx="9956516" cy="1200329"/>
+            <a:off x="1974013" y="7577681"/>
+            <a:ext cx="9956516" cy="1569660"/>
           </a:xfrm>
           <a:prstGeom prst="rect">
             <a:avLst/>
@@ -12998,18 +13161,21 @@
                 <a:ea typeface="+mn-lt"/>
                 <a:cs typeface="+mn-lt"/>
               </a:rPr>
-              <a:t>The process of creating HTML and CSS code for the visual part of a website is a challenge that requires attention to detail and a constant pursuit of perfection.</a:t>
+              <a:t>The two developers made a brief plan and divided up their duties, communicating through Discord throughout the process. They created a responsive site by brainstorming the design with their team.</a:t>
             </a:r>
-            <a:endParaRPr lang="en-GB" dirty="0"/>
+            <a:endParaRPr lang="en-GB" dirty="0">
+              <a:ea typeface="+mn-lt"/>
+              <a:cs typeface="+mn-lt"/>
+            </a:endParaRPr>
           </a:p>
         </p:txBody>
       </p:sp>
       <p:pic>
         <p:nvPicPr>
-          <p:cNvPr id="26" name="Picture 25" descr="A green rectangle with white text&#10;&#10;Description automatically generated">
-            <a:extLst>
-              <a:ext uri="{FF2B5EF4-FFF2-40B4-BE49-F238E27FC236}">
-                <a16:creationId xmlns:a16="http://schemas.microsoft.com/office/drawing/2014/main" id="{4C5674C0-2802-CA4A-DABF-0C8A2CD0A4AF}"/>
+          <p:cNvPr id="8" name="Picture 7" descr="A keyboard with green keys&#10;&#10;Description automatically generated">
+            <a:extLst>
+              <a:ext uri="{FF2B5EF4-FFF2-40B4-BE49-F238E27FC236}">
+                <a16:creationId xmlns:a16="http://schemas.microsoft.com/office/drawing/2014/main" id="{463059A1-4196-E3D7-24C9-B1012BD93C93}"/>
               </a:ext>
             </a:extLst>
           </p:cNvPr>
@@ -13026,8 +13192,8 @@
         </p:blipFill>
         <p:spPr>
           <a:xfrm>
-            <a:off x="13058340" y="3190778"/>
-            <a:ext cx="3603171" cy="1793410"/>
+            <a:off x="1106544" y="3563628"/>
+            <a:ext cx="3018065" cy="2985407"/>
           </a:xfrm>
           <a:prstGeom prst="round2DiagRect">
             <a:avLst>
@@ -13050,52 +13216,6 @@
           </a:effectLst>
         </p:spPr>
       </p:pic>
-      <p:pic>
-        <p:nvPicPr>
-          <p:cNvPr id="8" name="Picture 7" descr="A keyboard with green keys&#10;&#10;Description automatically generated">
-            <a:extLst>
-              <a:ext uri="{FF2B5EF4-FFF2-40B4-BE49-F238E27FC236}">
-                <a16:creationId xmlns:a16="http://schemas.microsoft.com/office/drawing/2014/main" id="{463059A1-4196-E3D7-24C9-B1012BD93C93}"/>
-              </a:ext>
-            </a:extLst>
-          </p:cNvPr>
-          <p:cNvPicPr>
-            <a:picLocks noChangeAspect="1"/>
-          </p:cNvPicPr>
-          <p:nvPr/>
-        </p:nvPicPr>
-        <p:blipFill>
-          <a:blip r:embed="rId3"/>
-          <a:stretch>
-            <a:fillRect/>
-          </a:stretch>
-        </p:blipFill>
-        <p:spPr>
-          <a:xfrm>
-            <a:off x="1163410" y="3438524"/>
-            <a:ext cx="3018065" cy="2985407"/>
-          </a:xfrm>
-          <a:prstGeom prst="round2DiagRect">
-            <a:avLst>
-              <a:gd name="adj1" fmla="val 16667"/>
-              <a:gd name="adj2" fmla="val 0"/>
-            </a:avLst>
-          </a:prstGeom>
-          <a:ln w="88900" cap="sq">
-            <a:solidFill>
-              <a:srgbClr val="FFFFFF"/>
-            </a:solidFill>
-            <a:miter lim="800000"/>
-          </a:ln>
-          <a:effectLst>
-            <a:outerShdw blurRad="254000" algn="tl" rotWithShape="0">
-              <a:srgbClr val="000000">
-                <a:alpha val="43000"/>
-              </a:srgbClr>
-            </a:outerShdw>
-          </a:effectLst>
-        </p:spPr>
-      </p:pic>
       <p:sp>
         <p:nvSpPr>
           <p:cNvPr id="18" name="TextBox 17">
@@ -13110,8 +13230,8 @@
         </p:nvSpPr>
         <p:spPr>
           <a:xfrm>
-            <a:off x="5112180" y="4398230"/>
-            <a:ext cx="6647260" cy="1569660"/>
+            <a:off x="5123553" y="4079782"/>
+            <a:ext cx="6647260" cy="2677656"/>
           </a:xfrm>
           <a:prstGeom prst="rect">
             <a:avLst/>
@@ -13158,12 +13278,51 @@
                 <a:ea typeface="+mn-lt"/>
                 <a:cs typeface="+mn-lt"/>
               </a:rPr>
-              <a:t>Using tools like Figma to create an aesthetic and user-friendly design. The designer shares design information with teammates.</a:t>
+              <a:t>The </a:t>
             </a:r>
-            <a:endParaRPr lang="en-GB" dirty="0">
-              <a:ea typeface="+mn-lt"/>
-              <a:cs typeface="+mn-lt"/>
-            </a:endParaRPr>
+            <a:r>
+              <a:rPr lang="en-GB" sz="2400" dirty="0" err="1">
+                <a:ea typeface="+mn-lt"/>
+                <a:cs typeface="+mn-lt"/>
+              </a:rPr>
+              <a:t>desinger</a:t>
+            </a:r>
+            <a:r>
+              <a:rPr lang="en-GB" sz="2400" dirty="0">
+                <a:ea typeface="+mn-lt"/>
+                <a:cs typeface="+mn-lt"/>
+              </a:rPr>
+              <a:t> took care of defining the </a:t>
+            </a:r>
+            <a:r>
+              <a:rPr lang="en-GB" sz="2400" dirty="0" err="1">
+                <a:ea typeface="+mn-lt"/>
+                <a:cs typeface="+mn-lt"/>
+              </a:rPr>
+              <a:t>color</a:t>
+            </a:r>
+            <a:r>
+              <a:rPr lang="en-GB" sz="2400" dirty="0">
+                <a:ea typeface="+mn-lt"/>
+                <a:cs typeface="+mn-lt"/>
+              </a:rPr>
+              <a:t> scheme, working closely with the team and commenting on the author's elements with the team. Determine the font and </a:t>
+            </a:r>
+            <a:r>
+              <a:rPr lang="en-GB" sz="2400" dirty="0" err="1">
+                <a:ea typeface="+mn-lt"/>
+                <a:cs typeface="+mn-lt"/>
+              </a:rPr>
+              <a:t>color</a:t>
+            </a:r>
+            <a:r>
+              <a:rPr lang="en-GB" sz="2400" dirty="0">
+                <a:ea typeface="+mn-lt"/>
+                <a:cs typeface="+mn-lt"/>
+              </a:rPr>
+              <a:t> norms of the site. Select the content of the site, dealing directly with the topic.</a:t>
+            </a:r>
+            <a:endParaRPr lang="en-GB" dirty="0"/>
           </a:p>
         </p:txBody>
       </p:sp>
@@ -13181,7 +13340,7 @@
         </p:nvSpPr>
         <p:spPr>
           <a:xfrm>
-            <a:off x="4474402" y="4399806"/>
+            <a:off x="4508521" y="4115478"/>
             <a:ext cx="463554" cy="495794"/>
           </a:xfrm>
           <a:prstGeom prst="flowChartOffpageConnector">
@@ -13239,8 +13398,8 @@
         </p:nvSpPr>
         <p:spPr>
           <a:xfrm>
-            <a:off x="2510494" y="1589716"/>
-            <a:ext cx="9281602" cy="1200329"/>
+            <a:off x="2533240" y="1384999"/>
+            <a:ext cx="9281602" cy="1938992"/>
           </a:xfrm>
           <a:prstGeom prst="rect">
             <a:avLst/>
@@ -13280,23 +13439,16 @@
           <a:p>
             <a:r>
               <a:rPr lang="en-GB" sz="2400" dirty="0">
-                <a:cs typeface="Calibri"/>
+                <a:ea typeface="+mn-lt"/>
+                <a:cs typeface="+mn-lt"/>
               </a:rPr>
-              <a:t>Defining the goals of the website - to inform, inspire and mobilize users.</a:t>
+              <a:t>The Scrum Trainer organized team meetings in the Discord app and together with the team determined the topic, following the strictly defined requirements described in the project documentation. They made the logo together and commented on the stage of work.</a:t>
             </a:r>
-            <a:endParaRPr lang="en-GB" sz="2400">
-              <a:cs typeface="Calibri" panose="020F0502020204030204"/>
+            <a:endParaRPr lang="en-GB" dirty="0">
+              <a:ea typeface="+mn-lt"/>
+              <a:cs typeface="+mn-lt"/>
             </a:endParaRPr>
           </a:p>
-          <a:p>
-            <a:r>
-              <a:rPr lang="en-GB" sz="2400" dirty="0">
-                <a:cs typeface="Calibri"/>
-              </a:rPr>
-              <a:t>Exploring the most effective ways to present environmental information.</a:t>
-            </a:r>
-            <a:endParaRPr lang="en-GB" sz="2400" dirty="0"/>
-          </a:p>
         </p:txBody>
       </p:sp>
       <p:sp>
@@ -13313,7 +13465,7 @@
         </p:nvSpPr>
         <p:spPr>
           <a:xfrm>
-            <a:off x="1840060" y="1591292"/>
+            <a:off x="1931045" y="1397949"/>
             <a:ext cx="463554" cy="495794"/>
           </a:xfrm>
           <a:prstGeom prst="flowChartOffpageConnector">
@@ -13357,6 +13509,110 @@
           </a:p>
         </p:txBody>
       </p:sp>
+      <p:sp>
+        <p:nvSpPr>
+          <p:cNvPr id="22" name="Flowchart: Off-page Connector 21">
+            <a:extLst>
+              <a:ext uri="{FF2B5EF4-FFF2-40B4-BE49-F238E27FC236}">
+                <a16:creationId xmlns:a16="http://schemas.microsoft.com/office/drawing/2014/main" id="{422B0E66-C437-FE73-D1E2-FCD824951441}"/>
+              </a:ext>
+            </a:extLst>
+          </p:cNvPr>
+          <p:cNvSpPr/>
+          <p:nvPr/>
+        </p:nvSpPr>
+        <p:spPr>
+          <a:xfrm>
+            <a:off x="-1931326" y="1583898"/>
+            <a:ext cx="463554" cy="495794"/>
+          </a:xfrm>
+          <a:prstGeom prst="flowChartOffpageConnector">
+            <a:avLst/>
+          </a:prstGeom>
+          <a:solidFill>
+            <a:srgbClr val="749074"/>
+          </a:solidFill>
+          <a:ln w="12700">
+            <a:noFill/>
+          </a:ln>
+        </p:spPr>
+        <p:style>
+          <a:lnRef idx="2">
+            <a:schemeClr val="accent1">
+              <a:shade val="15000"/>
+            </a:schemeClr>
+          </a:lnRef>
+          <a:fillRef idx="1">
+            <a:schemeClr val="accent1"/>
+          </a:fillRef>
+          <a:effectRef idx="0">
+            <a:schemeClr val="accent1"/>
+          </a:effectRef>
+          <a:fontRef idx="minor">
+            <a:schemeClr val="lt1"/>
+          </a:fontRef>
+        </p:style>
+        <p:txBody>
+          <a:bodyPr lIns="91440" tIns="45720" rIns="91440" bIns="45720" rtlCol="0" anchor="ctr"/>
+          <a:lstStyle/>
+          <a:p>
+            <a:pPr algn="ctr"/>
+            <a:r>
+              <a:rPr lang="en-GB" b="1" dirty="0">
+                <a:cs typeface="Calibri"/>
+              </a:rPr>
+              <a:t>3.</a:t>
+            </a:r>
+            <a:endParaRPr lang="en-GB" b="1" dirty="0"/>
+          </a:p>
+        </p:txBody>
+      </p:sp>
+      <p:pic>
+        <p:nvPicPr>
+          <p:cNvPr id="26" name="Picture 25" descr="A green rectangle with white text&#10;&#10;Description automatically generated">
+            <a:extLst>
+              <a:ext uri="{FF2B5EF4-FFF2-40B4-BE49-F238E27FC236}">
+                <a16:creationId xmlns:a16="http://schemas.microsoft.com/office/drawing/2014/main" id="{4C5674C0-2802-CA4A-DABF-0C8A2CD0A4AF}"/>
+              </a:ext>
+            </a:extLst>
+          </p:cNvPr>
+          <p:cNvPicPr>
+            <a:picLocks noChangeAspect="1"/>
+          </p:cNvPicPr>
+          <p:nvPr/>
+        </p:nvPicPr>
+        <p:blipFill>
+          <a:blip r:embed="rId3"/>
+          <a:stretch>
+            <a:fillRect/>
+          </a:stretch>
+        </p:blipFill>
+        <p:spPr>
+          <a:xfrm>
+            <a:off x="13058340" y="3190778"/>
+            <a:ext cx="3603171" cy="1793410"/>
+          </a:xfrm>
+          <a:prstGeom prst="round2DiagRect">
+            <a:avLst>
+              <a:gd name="adj1" fmla="val 16667"/>
+              <a:gd name="adj2" fmla="val 0"/>
+            </a:avLst>
+          </a:prstGeom>
+          <a:ln w="88900" cap="sq">
+            <a:solidFill>
+              <a:srgbClr val="FFFFFF"/>
+            </a:solidFill>
+            <a:miter lim="800000"/>
+          </a:ln>
+          <a:effectLst>
+            <a:outerShdw blurRad="254000" algn="tl" rotWithShape="0">
+              <a:srgbClr val="000000">
+                <a:alpha val="43000"/>
+              </a:srgbClr>
+            </a:outerShdw>
+          </a:effectLst>
+        </p:spPr>
+      </p:pic>
       <p:sp>
         <p:nvSpPr>
           <p:cNvPr id="2" name="TextBox 1">
@@ -13978,13 +14234,13 @@
   <p:clrMapOvr>
     <a:masterClrMapping/>
   </p:clrMapOvr>
-  <mc:AlternateContent xmlns:mc="http://schemas.openxmlformats.org/markup-compatibility/2006">
-    <mc:Choice xmlns:p159="http://schemas.microsoft.com/office/powerpoint/2015/09/main" Requires="p159">
+  <mc:AlternateContent xmlns:mc="http://schemas.openxmlformats.org/markup-compatibility/2006" xmlns:p159="http://schemas.microsoft.com/office/powerpoint/2015/09/main">
+    <mc:Choice Requires="p159">
       <p:transition xmlns:p14="http://schemas.microsoft.com/office/powerpoint/2010/main" spd="slow" p14:dur="2000">
         <p159:morph option="byObject"/>
       </p:transition>
     </mc:Choice>
-    <mc:Fallback>
+    <mc:Fallback xmlns="">
       <p:transition spd="slow">
         <p:fade/>
       </p:transition>
@@ -14010,54 +14266,12 @@
           <a:chExt cx="0" cy="0"/>
         </a:xfrm>
       </p:grpSpPr>
-      <p:sp>
-        <p:nvSpPr>
-          <p:cNvPr id="24" name="TextBox 23">
-            <a:extLst>
-              <a:ext uri="{FF2B5EF4-FFF2-40B4-BE49-F238E27FC236}">
-                <a16:creationId xmlns:a16="http://schemas.microsoft.com/office/drawing/2014/main" id="{46F85BF8-AAEC-C7A6-8884-B2C5E2315398}"/>
-              </a:ext>
-            </a:extLst>
-          </p:cNvPr>
-          <p:cNvSpPr txBox="1"/>
-          <p:nvPr/>
-        </p:nvSpPr>
-        <p:spPr>
-          <a:xfrm>
-            <a:off x="13209492" y="1223725"/>
-            <a:ext cx="6108491" cy="707886"/>
-          </a:xfrm>
-          <a:prstGeom prst="rect">
-            <a:avLst/>
-          </a:prstGeom>
-          <a:noFill/>
-        </p:spPr>
-        <p:txBody>
-          <a:bodyPr rot="0" spcFirstLastPara="0" vertOverflow="overflow" horzOverflow="overflow" vert="horz" wrap="square" lIns="91440" tIns="45720" rIns="91440" bIns="45720" numCol="1" spcCol="0" rtlCol="0" fromWordArt="0" anchor="t" anchorCtr="0" forceAA="0" compatLnSpc="1">
-            <a:prstTxWarp prst="textNoShape">
-              <a:avLst/>
-            </a:prstTxWarp>
-            <a:spAutoFit/>
-          </a:bodyPr>
-          <a:lstStyle/>
-          <a:p>
-            <a:pPr algn="ctr"/>
-            <a:r>
-              <a:rPr lang="en-GB" sz="4000" b="1" dirty="0">
-                <a:cs typeface="Calibri"/>
-              </a:rPr>
-              <a:t>Used Programs</a:t>
-            </a:r>
-            <a:endParaRPr lang="en-US" b="1"/>
-          </a:p>
-        </p:txBody>
-      </p:sp>
       <p:pic>
         <p:nvPicPr>
-          <p:cNvPr id="26" name="Picture 25" descr="A white logo with two dots&#10;&#10;Description automatically generated">
-            <a:extLst>
-              <a:ext uri="{FF2B5EF4-FFF2-40B4-BE49-F238E27FC236}">
-                <a16:creationId xmlns:a16="http://schemas.microsoft.com/office/drawing/2014/main" id="{5FDA78FD-87B7-8F59-AD73-106A8210F7F9}"/>
+          <p:cNvPr id="8" name="Picture 7" descr="A white logo with two dots&#10;&#10;Description automatically generated">
+            <a:extLst>
+              <a:ext uri="{FF2B5EF4-FFF2-40B4-BE49-F238E27FC236}">
+                <a16:creationId xmlns:a16="http://schemas.microsoft.com/office/drawing/2014/main" id="{84050F7A-9387-1F46-2E84-FE5F547EF49A}"/>
               </a:ext>
             </a:extLst>
           </p:cNvPr>
@@ -14074,20 +14288,30 @@
         </p:blipFill>
         <p:spPr>
           <a:xfrm>
-            <a:off x="-9881511" y="2425272"/>
-            <a:ext cx="2394939" cy="2366185"/>
+            <a:off x="-12038115" y="1922063"/>
+            <a:ext cx="1762336" cy="1762337"/>
           </a:xfrm>
           <a:prstGeom prst="rect">
             <a:avLst/>
           </a:prstGeom>
+          <a:ln>
+            <a:noFill/>
+          </a:ln>
+          <a:effectLst>
+            <a:outerShdw blurRad="190500" algn="tl" rotWithShape="0">
+              <a:srgbClr val="000000">
+                <a:alpha val="70000"/>
+              </a:srgbClr>
+            </a:outerShdw>
+          </a:effectLst>
         </p:spPr>
       </p:pic>
       <p:pic>
         <p:nvPicPr>
-          <p:cNvPr id="29" name="Picture 28" descr="A blue ribbon with a cross&#10;&#10;Description automatically generated">
-            <a:extLst>
-              <a:ext uri="{FF2B5EF4-FFF2-40B4-BE49-F238E27FC236}">
-                <a16:creationId xmlns:a16="http://schemas.microsoft.com/office/drawing/2014/main" id="{F2A0155E-80B3-B337-0392-F953B998A263}"/>
+          <p:cNvPr id="23" name="Picture 22" descr="A blue ribbon with a cross&#10;&#10;Description automatically generated">
+            <a:extLst>
+              <a:ext uri="{FF2B5EF4-FFF2-40B4-BE49-F238E27FC236}">
+                <a16:creationId xmlns:a16="http://schemas.microsoft.com/office/drawing/2014/main" id="{A1E3908E-A139-CDAF-5E14-5BA40A2D110C}"/>
               </a:ext>
             </a:extLst>
           </p:cNvPr>
@@ -14104,20 +14328,30 @@
         </p:blipFill>
         <p:spPr>
           <a:xfrm>
-            <a:off x="-7917645" y="4822283"/>
-            <a:ext cx="2994897" cy="2231367"/>
+            <a:off x="-9916098" y="2608168"/>
+            <a:ext cx="2462935" cy="1843179"/>
           </a:xfrm>
           <a:prstGeom prst="rect">
             <a:avLst/>
           </a:prstGeom>
+          <a:ln>
+            <a:noFill/>
+          </a:ln>
+          <a:effectLst>
+            <a:outerShdw blurRad="190500" algn="tl" rotWithShape="0">
+              <a:srgbClr val="000000">
+                <a:alpha val="70000"/>
+              </a:srgbClr>
+            </a:outerShdw>
+          </a:effectLst>
         </p:spPr>
       </p:pic>
       <p:pic>
         <p:nvPicPr>
-          <p:cNvPr id="31" name="Picture 30">
-            <a:extLst>
-              <a:ext uri="{FF2B5EF4-FFF2-40B4-BE49-F238E27FC236}">
-                <a16:creationId xmlns:a16="http://schemas.microsoft.com/office/drawing/2014/main" id="{A67AF3F2-8CD0-C3C1-B255-813F2AB996ED}"/>
+          <p:cNvPr id="27" name="Picture 26" descr="A colorful circle shapes on a black background&#10;&#10;Description automatically generated">
+            <a:extLst>
+              <a:ext uri="{FF2B5EF4-FFF2-40B4-BE49-F238E27FC236}">
+                <a16:creationId xmlns:a16="http://schemas.microsoft.com/office/drawing/2014/main" id="{81C33130-AF79-8E9C-A0D3-9945B9AE90AE}"/>
               </a:ext>
             </a:extLst>
           </p:cNvPr>
@@ -14134,20 +14368,30 @@
         </p:blipFill>
         <p:spPr>
           <a:xfrm>
-            <a:off x="-1967239" y="2565510"/>
-            <a:ext cx="1319684" cy="1978702"/>
+            <a:off x="-4655805" y="2680528"/>
+            <a:ext cx="1104024" cy="1691155"/>
           </a:xfrm>
           <a:prstGeom prst="rect">
             <a:avLst/>
           </a:prstGeom>
+          <a:ln>
+            <a:noFill/>
+          </a:ln>
+          <a:effectLst>
+            <a:outerShdw blurRad="190500" algn="tl" rotWithShape="0">
+              <a:srgbClr val="000000">
+                <a:alpha val="70000"/>
+              </a:srgbClr>
+            </a:outerShdw>
+          </a:effectLst>
         </p:spPr>
       </p:pic>
       <p:pic>
         <p:nvPicPr>
-          <p:cNvPr id="33" name="Picture 32" descr="A blue square with white letters&#10;&#10;Description automatically generated">
-            <a:extLst>
-              <a:ext uri="{FF2B5EF4-FFF2-40B4-BE49-F238E27FC236}">
-                <a16:creationId xmlns:a16="http://schemas.microsoft.com/office/drawing/2014/main" id="{6D126C50-FC90-47D4-8B30-00C500062CB0}"/>
+          <p:cNvPr id="32" name="Picture 31" descr="A blue square with white letters&#10;&#10;Description automatically generated">
+            <a:extLst>
+              <a:ext uri="{FF2B5EF4-FFF2-40B4-BE49-F238E27FC236}">
+                <a16:creationId xmlns:a16="http://schemas.microsoft.com/office/drawing/2014/main" id="{198ECD59-B43F-57B1-707D-6954E30849C8}"/>
               </a:ext>
             </a:extLst>
           </p:cNvPr>
@@ -14164,20 +14408,30 @@
         </p:blipFill>
         <p:spPr>
           <a:xfrm>
-            <a:off x="-6366342" y="2418932"/>
-            <a:ext cx="3407436" cy="1933755"/>
+            <a:off x="-10636417" y="4877459"/>
+            <a:ext cx="2774833" cy="1603076"/>
           </a:xfrm>
           <a:prstGeom prst="rect">
             <a:avLst/>
           </a:prstGeom>
+          <a:ln>
+            <a:noFill/>
+          </a:ln>
+          <a:effectLst>
+            <a:outerShdw blurRad="190500" algn="tl" rotWithShape="0">
+              <a:srgbClr val="000000">
+                <a:alpha val="70000"/>
+              </a:srgbClr>
+            </a:outerShdw>
+          </a:effectLst>
         </p:spPr>
       </p:pic>
       <p:pic>
         <p:nvPicPr>
-          <p:cNvPr id="35" name="Picture 34" descr="A logo with a black background&#10;&#10;Description automatically generated">
-            <a:extLst>
-              <a:ext uri="{FF2B5EF4-FFF2-40B4-BE49-F238E27FC236}">
-                <a16:creationId xmlns:a16="http://schemas.microsoft.com/office/drawing/2014/main" id="{450B1738-86DE-9EB8-C267-881D759D262E}"/>
+          <p:cNvPr id="36" name="Picture 35" descr="A logo with a black background&#10;&#10;Description automatically generated">
+            <a:extLst>
+              <a:ext uri="{FF2B5EF4-FFF2-40B4-BE49-F238E27FC236}">
+                <a16:creationId xmlns:a16="http://schemas.microsoft.com/office/drawing/2014/main" id="{390A6EDD-EBDE-D5B7-9564-CE91BB1B98CC}"/>
               </a:ext>
             </a:extLst>
           </p:cNvPr>
@@ -14194,20 +14448,30 @@
         </p:blipFill>
         <p:spPr>
           <a:xfrm>
-            <a:off x="-3099087" y="4751658"/>
-            <a:ext cx="2226269" cy="2058839"/>
+            <a:off x="-7153503" y="1962449"/>
+            <a:ext cx="1694307" cy="1555632"/>
           </a:xfrm>
           <a:prstGeom prst="rect">
             <a:avLst/>
           </a:prstGeom>
+          <a:ln>
+            <a:noFill/>
+          </a:ln>
+          <a:effectLst>
+            <a:outerShdw blurRad="190500" algn="tl" rotWithShape="0">
+              <a:srgbClr val="000000">
+                <a:alpha val="70000"/>
+              </a:srgbClr>
+            </a:outerShdw>
+          </a:effectLst>
         </p:spPr>
       </p:pic>
       <p:pic>
         <p:nvPicPr>
-          <p:cNvPr id="37" name="Picture 36">
-            <a:extLst>
-              <a:ext uri="{FF2B5EF4-FFF2-40B4-BE49-F238E27FC236}">
-                <a16:creationId xmlns:a16="http://schemas.microsoft.com/office/drawing/2014/main" id="{D56CA3B1-A209-B598-6D6F-55C65862F5FB}"/>
+          <p:cNvPr id="39" name="Picture 38">
+            <a:extLst>
+              <a:ext uri="{FF2B5EF4-FFF2-40B4-BE49-F238E27FC236}">
+                <a16:creationId xmlns:a16="http://schemas.microsoft.com/office/drawing/2014/main" id="{5AA1D83D-9B17-63FF-9802-9E086796A8D7}"/>
               </a:ext>
             </a:extLst>
           </p:cNvPr>
@@ -14224,20 +14488,30 @@
         </p:blipFill>
         <p:spPr>
           <a:xfrm>
-            <a:off x="-11993813" y="4758573"/>
-            <a:ext cx="2332009" cy="2288878"/>
+            <a:off x="-12784568" y="4442270"/>
+            <a:ext cx="2044463" cy="1958200"/>
           </a:xfrm>
           <a:prstGeom prst="rect">
             <a:avLst/>
           </a:prstGeom>
+          <a:ln>
+            <a:noFill/>
+          </a:ln>
+          <a:effectLst>
+            <a:outerShdw blurRad="190500" algn="tl" rotWithShape="0">
+              <a:srgbClr val="000000">
+                <a:alpha val="70000"/>
+              </a:srgbClr>
+            </a:outerShdw>
+          </a:effectLst>
         </p:spPr>
       </p:pic>
       <p:pic>
         <p:nvPicPr>
-          <p:cNvPr id="22" name="Picture 21" descr="A green rectangle with white text&#10;&#10;Description automatically generated">
-            <a:extLst>
-              <a:ext uri="{FF2B5EF4-FFF2-40B4-BE49-F238E27FC236}">
-                <a16:creationId xmlns:a16="http://schemas.microsoft.com/office/drawing/2014/main" id="{FE53953E-62DF-7293-F590-A0A6ED6ADCB6}"/>
+          <p:cNvPr id="41" name="Picture 40" descr="A logo of a software developer&#10;&#10;Description automatically generated">
+            <a:extLst>
+              <a:ext uri="{FF2B5EF4-FFF2-40B4-BE49-F238E27FC236}">
+                <a16:creationId xmlns:a16="http://schemas.microsoft.com/office/drawing/2014/main" id="{24FDEBE7-2AA4-90AB-D1BD-365F4F504345}"/>
               </a:ext>
             </a:extLst>
           </p:cNvPr>
@@ -14254,30 +14528,212 @@
         </p:blipFill>
         <p:spPr>
           <a:xfrm>
-            <a:off x="4963887" y="2989495"/>
-            <a:ext cx="3603171" cy="1793410"/>
-          </a:xfrm>
-          <a:prstGeom prst="round2DiagRect">
-            <a:avLst>
-              <a:gd name="adj1" fmla="val 16667"/>
-              <a:gd name="adj2" fmla="val 0"/>
-            </a:avLst>
-          </a:prstGeom>
-          <a:ln w="88900" cap="sq">
-            <a:solidFill>
-              <a:srgbClr val="FFFFFF"/>
-            </a:solidFill>
-            <a:miter lim="800000"/>
+            <a:off x="-7447539" y="4804365"/>
+            <a:ext cx="1843178" cy="1857555"/>
+          </a:xfrm>
+          <a:prstGeom prst="rect">
+            <a:avLst/>
+          </a:prstGeom>
+          <a:ln>
+            <a:noFill/>
           </a:ln>
           <a:effectLst>
-            <a:outerShdw blurRad="254000" algn="tl" rotWithShape="0">
+            <a:outerShdw blurRad="190500" algn="tl" rotWithShape="0">
               <a:srgbClr val="000000">
-                <a:alpha val="43000"/>
+                <a:alpha val="70000"/>
               </a:srgbClr>
             </a:outerShdw>
           </a:effectLst>
         </p:spPr>
       </p:pic>
+      <p:pic>
+        <p:nvPicPr>
+          <p:cNvPr id="43" name="Picture 42" descr="A yellow and black logo&#10;&#10;Description automatically generated">
+            <a:extLst>
+              <a:ext uri="{FF2B5EF4-FFF2-40B4-BE49-F238E27FC236}">
+                <a16:creationId xmlns:a16="http://schemas.microsoft.com/office/drawing/2014/main" id="{B1C5ECAD-FF82-8517-C446-CE886153AD03}"/>
+              </a:ext>
+            </a:extLst>
+          </p:cNvPr>
+          <p:cNvPicPr>
+            <a:picLocks noChangeAspect="1"/>
+          </p:cNvPicPr>
+          <p:nvPr/>
+        </p:nvPicPr>
+        <p:blipFill>
+          <a:blip r:embed="rId9"/>
+          <a:stretch>
+            <a:fillRect/>
+          </a:stretch>
+        </p:blipFill>
+        <p:spPr>
+          <a:xfrm>
+            <a:off x="-5240854" y="4795962"/>
+            <a:ext cx="1695091" cy="1865462"/>
+          </a:xfrm>
+          <a:prstGeom prst="rect">
+            <a:avLst/>
+          </a:prstGeom>
+          <a:ln>
+            <a:noFill/>
+          </a:ln>
+          <a:effectLst>
+            <a:outerShdw blurRad="190500" algn="tl" rotWithShape="0">
+              <a:srgbClr val="000000">
+                <a:alpha val="70000"/>
+              </a:srgbClr>
+            </a:outerShdw>
+          </a:effectLst>
+        </p:spPr>
+      </p:pic>
+      <p:pic>
+        <p:nvPicPr>
+          <p:cNvPr id="45" name="Picture 44" descr="A blue and white logo&#10;&#10;Description automatically generated">
+            <a:extLst>
+              <a:ext uri="{FF2B5EF4-FFF2-40B4-BE49-F238E27FC236}">
+                <a16:creationId xmlns:a16="http://schemas.microsoft.com/office/drawing/2014/main" id="{6BA49565-A4A2-A179-FC37-DA6DD5E1741C}"/>
+              </a:ext>
+            </a:extLst>
+          </p:cNvPr>
+          <p:cNvPicPr>
+            <a:picLocks noChangeAspect="1"/>
+          </p:cNvPicPr>
+          <p:nvPr/>
+        </p:nvPicPr>
+        <p:blipFill>
+          <a:blip r:embed="rId10"/>
+          <a:stretch>
+            <a:fillRect/>
+          </a:stretch>
+        </p:blipFill>
+        <p:spPr>
+          <a:xfrm>
+            <a:off x="-3263044" y="4800942"/>
+            <a:ext cx="1828800" cy="1857555"/>
+          </a:xfrm>
+          <a:prstGeom prst="rect">
+            <a:avLst/>
+          </a:prstGeom>
+          <a:ln>
+            <a:noFill/>
+          </a:ln>
+          <a:effectLst>
+            <a:outerShdw blurRad="190500" algn="tl" rotWithShape="0">
+              <a:srgbClr val="000000">
+                <a:alpha val="70000"/>
+              </a:srgbClr>
+            </a:outerShdw>
+          </a:effectLst>
+        </p:spPr>
+      </p:pic>
+      <p:pic>
+        <p:nvPicPr>
+          <p:cNvPr id="47" name="Picture 46" descr="A purple and white sign with a black background&#10;&#10;Description automatically generated">
+            <a:extLst>
+              <a:ext uri="{FF2B5EF4-FFF2-40B4-BE49-F238E27FC236}">
+                <a16:creationId xmlns:a16="http://schemas.microsoft.com/office/drawing/2014/main" id="{4DC80B11-FDDF-EB00-1815-6674B919A717}"/>
+              </a:ext>
+            </a:extLst>
+          </p:cNvPr>
+          <p:cNvPicPr>
+            <a:picLocks noChangeAspect="1"/>
+          </p:cNvPicPr>
+          <p:nvPr/>
+        </p:nvPicPr>
+        <p:blipFill>
+          <a:blip r:embed="rId11"/>
+          <a:stretch>
+            <a:fillRect/>
+          </a:stretch>
+        </p:blipFill>
+        <p:spPr>
+          <a:xfrm>
+            <a:off x="-3199373" y="1720765"/>
+            <a:ext cx="1929444" cy="1929443"/>
+          </a:xfrm>
+          <a:prstGeom prst="rect">
+            <a:avLst/>
+          </a:prstGeom>
+          <a:ln>
+            <a:noFill/>
+          </a:ln>
+          <a:effectLst>
+            <a:outerShdw blurRad="190500" algn="tl" rotWithShape="0">
+              <a:srgbClr val="000000">
+                <a:alpha val="70000"/>
+              </a:srgbClr>
+            </a:outerShdw>
+          </a:effectLst>
+        </p:spPr>
+      </p:pic>
+      <p:sp>
+        <p:nvSpPr>
+          <p:cNvPr id="18" name="TextBox 17">
+            <a:extLst>
+              <a:ext uri="{FF2B5EF4-FFF2-40B4-BE49-F238E27FC236}">
+                <a16:creationId xmlns:a16="http://schemas.microsoft.com/office/drawing/2014/main" id="{F3BDFA0B-A124-3523-5B32-EB5CDC68DFD6}"/>
+              </a:ext>
+            </a:extLst>
+          </p:cNvPr>
+          <p:cNvSpPr txBox="1"/>
+          <p:nvPr/>
+        </p:nvSpPr>
+        <p:spPr>
+          <a:xfrm>
+            <a:off x="1737608" y="5018716"/>
+            <a:ext cx="6647260" cy="1569660"/>
+          </a:xfrm>
+          <a:prstGeom prst="rect">
+            <a:avLst/>
+          </a:prstGeom>
+          <a:noFill/>
+          <a:ln w="28575">
+            <a:solidFill>
+              <a:schemeClr val="tx1"/>
+            </a:solidFill>
+          </a:ln>
+        </p:spPr>
+        <p:txBody>
+          <a:bodyPr rot="0" spcFirstLastPara="0" vertOverflow="overflow" horzOverflow="overflow" vert="horz" wrap="square" lIns="91440" tIns="45720" rIns="91440" bIns="45720" numCol="1" spcCol="0" rtlCol="0" fromWordArt="0" anchor="t" anchorCtr="0" forceAA="0" compatLnSpc="1">
+            <a:prstTxWarp prst="textNoShape">
+              <a:avLst/>
+            </a:prstTxWarp>
+            <a:spAutoFit/>
+          </a:bodyPr>
+          <a:lstStyle/>
+          <a:p>
+            <a:r>
+              <a:rPr lang="en-GB" sz="2400" b="1" dirty="0">
+                <a:solidFill>
+                  <a:srgbClr val="749074"/>
+                </a:solidFill>
+                <a:ea typeface="+mn-lt"/>
+                <a:cs typeface="+mn-lt"/>
+              </a:rPr>
+              <a:t>Testing and Analysis</a:t>
+            </a:r>
+            <a:r>
+              <a:rPr lang="en-GB" sz="2400" b="1" dirty="0">
+                <a:cs typeface="Calibri"/>
+              </a:rPr>
+              <a:t>: </a:t>
+            </a:r>
+            <a:endParaRPr lang="en-US" b="1" dirty="0">
+              <a:cs typeface="Calibri"/>
+            </a:endParaRPr>
+          </a:p>
+          <a:p>
+            <a:r>
+              <a:rPr lang="en-GB" sz="2400" dirty="0">
+                <a:ea typeface="+mn-lt"/>
+                <a:cs typeface="+mn-lt"/>
+              </a:rPr>
+              <a:t>The team made sure of the perfect functionality of the site by checking every detail of it. They tested the site in different browsers.</a:t>
+            </a:r>
+            <a:endParaRPr lang="en-GB" dirty="0"/>
+          </a:p>
+        </p:txBody>
+      </p:sp>
       <p:sp>
         <p:nvSpPr>
           <p:cNvPr id="4" name="TextBox 3">
@@ -14292,8 +14748,8 @@
         </p:nvSpPr>
         <p:spPr>
           <a:xfrm>
-            <a:off x="2031522" y="1567945"/>
-            <a:ext cx="9956516" cy="1200329"/>
+            <a:off x="2031522" y="1294775"/>
+            <a:ext cx="9956516" cy="1569660"/>
           </a:xfrm>
           <a:prstGeom prst="rect">
             <a:avLst/>
@@ -14347,12 +14803,103 @@
                 <a:ea typeface="+mn-lt"/>
                 <a:cs typeface="+mn-lt"/>
               </a:rPr>
-              <a:t>The process of creating HTML and CSS code for the visual part of a website is a challenge that requires attention to detail and a constant pursuit of perfection.</a:t>
+              <a:t>The two developers made a brief plan and divided up their duties, communicating through Discord throughout the process. They created a responsive site by brainstorming the design with their team.</a:t>
             </a:r>
-            <a:endParaRPr lang="en-GB" dirty="0"/>
-          </a:p>
-        </p:txBody>
-      </p:sp>
+            <a:endParaRPr lang="en-GB" dirty="0">
+              <a:ea typeface="+mn-lt"/>
+              <a:cs typeface="+mn-lt"/>
+            </a:endParaRPr>
+          </a:p>
+        </p:txBody>
+      </p:sp>
+      <p:sp>
+        <p:nvSpPr>
+          <p:cNvPr id="24" name="TextBox 23">
+            <a:extLst>
+              <a:ext uri="{FF2B5EF4-FFF2-40B4-BE49-F238E27FC236}">
+                <a16:creationId xmlns:a16="http://schemas.microsoft.com/office/drawing/2014/main" id="{46F85BF8-AAEC-C7A6-8884-B2C5E2315398}"/>
+              </a:ext>
+            </a:extLst>
+          </p:cNvPr>
+          <p:cNvSpPr txBox="1"/>
+          <p:nvPr/>
+        </p:nvSpPr>
+        <p:spPr>
+          <a:xfrm>
+            <a:off x="13209492" y="1223725"/>
+            <a:ext cx="6108491" cy="707886"/>
+          </a:xfrm>
+          <a:prstGeom prst="rect">
+            <a:avLst/>
+          </a:prstGeom>
+          <a:noFill/>
+        </p:spPr>
+        <p:txBody>
+          <a:bodyPr rot="0" spcFirstLastPara="0" vertOverflow="overflow" horzOverflow="overflow" vert="horz" wrap="square" lIns="91440" tIns="45720" rIns="91440" bIns="45720" numCol="1" spcCol="0" rtlCol="0" fromWordArt="0" anchor="t" anchorCtr="0" forceAA="0" compatLnSpc="1">
+            <a:prstTxWarp prst="textNoShape">
+              <a:avLst/>
+            </a:prstTxWarp>
+            <a:spAutoFit/>
+          </a:bodyPr>
+          <a:lstStyle/>
+          <a:p>
+            <a:pPr algn="ctr"/>
+            <a:r>
+              <a:rPr lang="en-GB" sz="4000" b="1" dirty="0">
+                <a:cs typeface="Calibri"/>
+              </a:rPr>
+              <a:t>Used Programs</a:t>
+            </a:r>
+            <a:endParaRPr lang="en-US" b="1"/>
+          </a:p>
+        </p:txBody>
+      </p:sp>
+      <p:pic>
+        <p:nvPicPr>
+          <p:cNvPr id="22" name="Picture 21" descr="A green rectangle with white text&#10;&#10;Description automatically generated">
+            <a:extLst>
+              <a:ext uri="{FF2B5EF4-FFF2-40B4-BE49-F238E27FC236}">
+                <a16:creationId xmlns:a16="http://schemas.microsoft.com/office/drawing/2014/main" id="{FE53953E-62DF-7293-F590-A0A6ED6ADCB6}"/>
+              </a:ext>
+            </a:extLst>
+          </p:cNvPr>
+          <p:cNvPicPr>
+            <a:picLocks noChangeAspect="1"/>
+          </p:cNvPicPr>
+          <p:nvPr/>
+        </p:nvPicPr>
+        <p:blipFill>
+          <a:blip r:embed="rId12"/>
+          <a:stretch>
+            <a:fillRect/>
+          </a:stretch>
+        </p:blipFill>
+        <p:spPr>
+          <a:xfrm>
+            <a:off x="4949510" y="3047004"/>
+            <a:ext cx="3603171" cy="1793410"/>
+          </a:xfrm>
+          <a:prstGeom prst="round2DiagRect">
+            <a:avLst>
+              <a:gd name="adj1" fmla="val 16667"/>
+              <a:gd name="adj2" fmla="val 0"/>
+            </a:avLst>
+          </a:prstGeom>
+          <a:ln w="88900" cap="sq">
+            <a:solidFill>
+              <a:srgbClr val="FFFFFF"/>
+            </a:solidFill>
+            <a:miter lim="800000"/>
+          </a:ln>
+          <a:effectLst>
+            <a:outerShdw blurRad="254000" algn="tl" rotWithShape="0">
+              <a:srgbClr val="000000">
+                <a:alpha val="43000"/>
+              </a:srgbClr>
+            </a:outerShdw>
+          </a:effectLst>
+        </p:spPr>
+      </p:pic>
       <p:sp>
         <p:nvSpPr>
           <p:cNvPr id="13" name="Flowchart: Off-page Connector 12">
@@ -14367,7 +14914,7 @@
         </p:nvSpPr>
         <p:spPr>
           <a:xfrm>
-            <a:off x="1361089" y="1569521"/>
+            <a:off x="1404221" y="1296351"/>
             <a:ext cx="463554" cy="495794"/>
           </a:xfrm>
           <a:prstGeom prst="flowChartOffpageConnector">
@@ -14966,7 +15513,7 @@
           <p:nvPr/>
         </p:nvPicPr>
         <p:blipFill>
-          <a:blip r:embed="rId9"/>
+          <a:blip r:embed="rId13"/>
           <a:stretch>
             <a:fillRect/>
           </a:stretch>
@@ -15019,77 +15566,6 @@
               </a:rPr>
               <a:t>Stages of Development</a:t>
             </a:r>
-          </a:p>
-        </p:txBody>
-      </p:sp>
-      <p:sp>
-        <p:nvSpPr>
-          <p:cNvPr id="18" name="TextBox 17">
-            <a:extLst>
-              <a:ext uri="{FF2B5EF4-FFF2-40B4-BE49-F238E27FC236}">
-                <a16:creationId xmlns:a16="http://schemas.microsoft.com/office/drawing/2014/main" id="{F3BDFA0B-A124-3523-5B32-EB5CDC68DFD6}"/>
-              </a:ext>
-            </a:extLst>
-          </p:cNvPr>
-          <p:cNvSpPr txBox="1"/>
-          <p:nvPr/>
-        </p:nvSpPr>
-        <p:spPr>
-          <a:xfrm>
-            <a:off x="1737608" y="5018716"/>
-            <a:ext cx="6647260" cy="1569660"/>
-          </a:xfrm>
-          <a:prstGeom prst="rect">
-            <a:avLst/>
-          </a:prstGeom>
-          <a:noFill/>
-          <a:ln w="28575">
-            <a:solidFill>
-              <a:schemeClr val="tx1"/>
-            </a:solidFill>
-          </a:ln>
-        </p:spPr>
-        <p:txBody>
-          <a:bodyPr rot="0" spcFirstLastPara="0" vertOverflow="overflow" horzOverflow="overflow" vert="horz" wrap="square" lIns="91440" tIns="45720" rIns="91440" bIns="45720" numCol="1" spcCol="0" rtlCol="0" fromWordArt="0" anchor="t" anchorCtr="0" forceAA="0" compatLnSpc="1">
-            <a:prstTxWarp prst="textNoShape">
-              <a:avLst/>
-            </a:prstTxWarp>
-            <a:spAutoFit/>
-          </a:bodyPr>
-          <a:lstStyle/>
-          <a:p>
-            <a:r>
-              <a:rPr lang="en-GB" sz="2400" b="1" dirty="0">
-                <a:solidFill>
-                  <a:srgbClr val="749074"/>
-                </a:solidFill>
-                <a:ea typeface="+mn-lt"/>
-                <a:cs typeface="+mn-lt"/>
-              </a:rPr>
-              <a:t>Testing and Analysis</a:t>
-            </a:r>
-            <a:r>
-              <a:rPr lang="en-GB" sz="2400" b="1" dirty="0">
-                <a:cs typeface="Calibri"/>
-              </a:rPr>
-              <a:t>: </a:t>
-            </a:r>
-            <a:endParaRPr lang="en-US" b="1" dirty="0">
-              <a:cs typeface="Calibri"/>
-            </a:endParaRPr>
-          </a:p>
-          <a:p>
-            <a:r>
-              <a:rPr lang="en-GB" sz="2400" dirty="0">
-                <a:ea typeface="+mn-lt"/>
-                <a:cs typeface="+mn-lt"/>
-              </a:rPr>
-              <a:t>Using tools like Figma to create an aesthetic and user-friendly design. The designer shares design information with teammates.</a:t>
-            </a:r>
-            <a:endParaRPr lang="en-GB" dirty="0">
-              <a:ea typeface="+mn-lt"/>
-              <a:cs typeface="+mn-lt"/>
-            </a:endParaRPr>
           </a:p>
         </p:txBody>
       </p:sp>
@@ -15166,7 +15642,7 @@
           <p:nvPr/>
         </p:nvPicPr>
         <p:blipFill>
-          <a:blip r:embed="rId10"/>
+          <a:blip r:embed="rId14"/>
           <a:stretch>
             <a:fillRect/>
           </a:stretch>
@@ -15212,14 +15688,14 @@
           <p:nvPr/>
         </p:nvPicPr>
         <p:blipFill>
-          <a:blip r:embed="rId11"/>
+          <a:blip r:embed="rId15"/>
           <a:stretch>
             <a:fillRect/>
           </a:stretch>
         </p:blipFill>
         <p:spPr>
           <a:xfrm>
-            <a:off x="1455284" y="2951390"/>
+            <a:off x="1469661" y="2994522"/>
             <a:ext cx="2466975" cy="1847850"/>
           </a:xfrm>
           <a:prstGeom prst="round2DiagRect">
@@ -15253,13 +15729,13 @@
   <p:clrMapOvr>
     <a:masterClrMapping/>
   </p:clrMapOvr>
-  <mc:AlternateContent xmlns:mc="http://schemas.openxmlformats.org/markup-compatibility/2006">
-    <mc:Choice xmlns:p159="http://schemas.microsoft.com/office/powerpoint/2015/09/main" Requires="p159">
+  <mc:AlternateContent xmlns:mc="http://schemas.openxmlformats.org/markup-compatibility/2006" xmlns:p159="http://schemas.microsoft.com/office/powerpoint/2015/09/main">
+    <mc:Choice Requires="p159">
       <p:transition xmlns:p14="http://schemas.microsoft.com/office/powerpoint/2010/main" spd="slow" p14:dur="2000">
         <p159:morph option="byObject"/>
       </p:transition>
     </mc:Choice>
-    <mc:Fallback>
+    <mc:Fallback xmlns="">
       <p:transition spd="slow">
         <p:fade/>
       </p:transition>
@@ -15307,12 +15783,22 @@
         </p:blipFill>
         <p:spPr>
           <a:xfrm>
-            <a:off x="2324866" y="2080215"/>
-            <a:ext cx="2394939" cy="2366185"/>
+            <a:off x="1217810" y="1864554"/>
+            <a:ext cx="1762336" cy="1762337"/>
           </a:xfrm>
           <a:prstGeom prst="rect">
             <a:avLst/>
           </a:prstGeom>
+          <a:ln>
+            <a:noFill/>
+          </a:ln>
+          <a:effectLst>
+            <a:outerShdw blurRad="190500" algn="tl" rotWithShape="0">
+              <a:srgbClr val="000000">
+                <a:alpha val="70000"/>
+              </a:srgbClr>
+            </a:outerShdw>
+          </a:effectLst>
         </p:spPr>
       </p:pic>
       <p:pic>
@@ -15337,12 +15823,22 @@
         </p:blipFill>
         <p:spPr>
           <a:xfrm>
-            <a:off x="4288732" y="4477226"/>
-            <a:ext cx="2994897" cy="2231367"/>
+            <a:off x="3339827" y="2550659"/>
+            <a:ext cx="2462935" cy="1843179"/>
           </a:xfrm>
           <a:prstGeom prst="rect">
             <a:avLst/>
           </a:prstGeom>
+          <a:ln>
+            <a:noFill/>
+          </a:ln>
+          <a:effectLst>
+            <a:outerShdw blurRad="190500" algn="tl" rotWithShape="0">
+              <a:srgbClr val="000000">
+                <a:alpha val="70000"/>
+              </a:srgbClr>
+            </a:outerShdw>
+          </a:effectLst>
         </p:spPr>
       </p:pic>
       <p:pic>
@@ -15367,12 +15863,22 @@
         </p:blipFill>
         <p:spPr>
           <a:xfrm>
-            <a:off x="10239138" y="2220453"/>
-            <a:ext cx="1319684" cy="1978702"/>
+            <a:off x="8600119" y="2623019"/>
+            <a:ext cx="1104024" cy="1691155"/>
           </a:xfrm>
           <a:prstGeom prst="rect">
             <a:avLst/>
           </a:prstGeom>
+          <a:ln>
+            <a:noFill/>
+          </a:ln>
+          <a:effectLst>
+            <a:outerShdw blurRad="190500" algn="tl" rotWithShape="0">
+              <a:srgbClr val="000000">
+                <a:alpha val="70000"/>
+              </a:srgbClr>
+            </a:outerShdw>
+          </a:effectLst>
         </p:spPr>
       </p:pic>
       <p:pic>
@@ -15397,12 +15903,22 @@
         </p:blipFill>
         <p:spPr>
           <a:xfrm>
-            <a:off x="5840035" y="2073875"/>
-            <a:ext cx="3407436" cy="1933755"/>
+            <a:off x="2619508" y="4819950"/>
+            <a:ext cx="2774833" cy="1603076"/>
           </a:xfrm>
           <a:prstGeom prst="rect">
             <a:avLst/>
           </a:prstGeom>
+          <a:ln>
+            <a:noFill/>
+          </a:ln>
+          <a:effectLst>
+            <a:outerShdw blurRad="190500" algn="tl" rotWithShape="0">
+              <a:srgbClr val="000000">
+                <a:alpha val="70000"/>
+              </a:srgbClr>
+            </a:outerShdw>
+          </a:effectLst>
         </p:spPr>
       </p:pic>
       <p:pic>
@@ -15427,12 +15943,22 @@
         </p:blipFill>
         <p:spPr>
           <a:xfrm>
-            <a:off x="9107290" y="4406601"/>
-            <a:ext cx="2226269" cy="2058839"/>
+            <a:off x="6102422" y="1904940"/>
+            <a:ext cx="1694307" cy="1555632"/>
           </a:xfrm>
           <a:prstGeom prst="rect">
             <a:avLst/>
           </a:prstGeom>
+          <a:ln>
+            <a:noFill/>
+          </a:ln>
+          <a:effectLst>
+            <a:outerShdw blurRad="190500" algn="tl" rotWithShape="0">
+              <a:srgbClr val="000000">
+                <a:alpha val="70000"/>
+              </a:srgbClr>
+            </a:outerShdw>
+          </a:effectLst>
         </p:spPr>
       </p:pic>
       <p:pic>
@@ -15457,12 +15983,182 @@
         </p:blipFill>
         <p:spPr>
           <a:xfrm>
-            <a:off x="212564" y="4413516"/>
-            <a:ext cx="2332009" cy="2288878"/>
+            <a:off x="471357" y="4384761"/>
+            <a:ext cx="2044463" cy="1958200"/>
           </a:xfrm>
           <a:prstGeom prst="rect">
             <a:avLst/>
           </a:prstGeom>
+          <a:ln>
+            <a:noFill/>
+          </a:ln>
+          <a:effectLst>
+            <a:outerShdw blurRad="190500" algn="tl" rotWithShape="0">
+              <a:srgbClr val="000000">
+                <a:alpha val="70000"/>
+              </a:srgbClr>
+            </a:outerShdw>
+          </a:effectLst>
+        </p:spPr>
+      </p:pic>
+      <p:pic>
+        <p:nvPicPr>
+          <p:cNvPr id="8" name="Picture 7" descr="A logo of a software developer&#10;&#10;Description automatically generated">
+            <a:extLst>
+              <a:ext uri="{FF2B5EF4-FFF2-40B4-BE49-F238E27FC236}">
+                <a16:creationId xmlns:a16="http://schemas.microsoft.com/office/drawing/2014/main" id="{5DF65D32-5C17-9455-2824-9F40653ED435}"/>
+              </a:ext>
+            </a:extLst>
+          </p:cNvPr>
+          <p:cNvPicPr>
+            <a:picLocks noChangeAspect="1"/>
+          </p:cNvPicPr>
+          <p:nvPr/>
+        </p:nvPicPr>
+        <p:blipFill>
+          <a:blip r:embed="rId8"/>
+          <a:stretch>
+            <a:fillRect/>
+          </a:stretch>
+        </p:blipFill>
+        <p:spPr>
+          <a:xfrm>
+            <a:off x="5808386" y="4746856"/>
+            <a:ext cx="1843178" cy="1857555"/>
+          </a:xfrm>
+          <a:prstGeom prst="rect">
+            <a:avLst/>
+          </a:prstGeom>
+          <a:ln>
+            <a:noFill/>
+          </a:ln>
+          <a:effectLst>
+            <a:outerShdw blurRad="190500" algn="tl" rotWithShape="0">
+              <a:srgbClr val="000000">
+                <a:alpha val="70000"/>
+              </a:srgbClr>
+            </a:outerShdw>
+          </a:effectLst>
+        </p:spPr>
+      </p:pic>
+      <p:pic>
+        <p:nvPicPr>
+          <p:cNvPr id="25" name="Picture 24" descr="A yellow and black logo&#10;&#10;Description automatically generated">
+            <a:extLst>
+              <a:ext uri="{FF2B5EF4-FFF2-40B4-BE49-F238E27FC236}">
+                <a16:creationId xmlns:a16="http://schemas.microsoft.com/office/drawing/2014/main" id="{A97EB88D-32A5-AF1C-DEFA-EB7703DDABEE}"/>
+              </a:ext>
+            </a:extLst>
+          </p:cNvPr>
+          <p:cNvPicPr>
+            <a:picLocks noChangeAspect="1"/>
+          </p:cNvPicPr>
+          <p:nvPr/>
+        </p:nvPicPr>
+        <p:blipFill>
+          <a:blip r:embed="rId9"/>
+          <a:stretch>
+            <a:fillRect/>
+          </a:stretch>
+        </p:blipFill>
+        <p:spPr>
+          <a:xfrm>
+            <a:off x="8015071" y="4738453"/>
+            <a:ext cx="1695091" cy="1865462"/>
+          </a:xfrm>
+          <a:prstGeom prst="rect">
+            <a:avLst/>
+          </a:prstGeom>
+          <a:ln>
+            <a:noFill/>
+          </a:ln>
+          <a:effectLst>
+            <a:outerShdw blurRad="190500" algn="tl" rotWithShape="0">
+              <a:srgbClr val="000000">
+                <a:alpha val="70000"/>
+              </a:srgbClr>
+            </a:outerShdw>
+          </a:effectLst>
+        </p:spPr>
+      </p:pic>
+      <p:pic>
+        <p:nvPicPr>
+          <p:cNvPr id="26" name="Picture 25" descr="A blue and white logo&#10;&#10;Description automatically generated">
+            <a:extLst>
+              <a:ext uri="{FF2B5EF4-FFF2-40B4-BE49-F238E27FC236}">
+                <a16:creationId xmlns:a16="http://schemas.microsoft.com/office/drawing/2014/main" id="{5536FB5D-17F0-58E1-87CE-2DD2A0B678D6}"/>
+              </a:ext>
+            </a:extLst>
+          </p:cNvPr>
+          <p:cNvPicPr>
+            <a:picLocks noChangeAspect="1"/>
+          </p:cNvPicPr>
+          <p:nvPr/>
+        </p:nvPicPr>
+        <p:blipFill>
+          <a:blip r:embed="rId10"/>
+          <a:stretch>
+            <a:fillRect/>
+          </a:stretch>
+        </p:blipFill>
+        <p:spPr>
+          <a:xfrm>
+            <a:off x="9992881" y="4743433"/>
+            <a:ext cx="1828800" cy="1857555"/>
+          </a:xfrm>
+          <a:prstGeom prst="rect">
+            <a:avLst/>
+          </a:prstGeom>
+          <a:ln>
+            <a:noFill/>
+          </a:ln>
+          <a:effectLst>
+            <a:outerShdw blurRad="190500" algn="tl" rotWithShape="0">
+              <a:srgbClr val="000000">
+                <a:alpha val="70000"/>
+              </a:srgbClr>
+            </a:outerShdw>
+          </a:effectLst>
+        </p:spPr>
+      </p:pic>
+      <p:pic>
+        <p:nvPicPr>
+          <p:cNvPr id="27" name="Picture 26" descr="A purple and white sign with a black background&#10;&#10;Description automatically generated">
+            <a:extLst>
+              <a:ext uri="{FF2B5EF4-FFF2-40B4-BE49-F238E27FC236}">
+                <a16:creationId xmlns:a16="http://schemas.microsoft.com/office/drawing/2014/main" id="{DA4483E4-73B5-5699-98A7-0FF602392A72}"/>
+              </a:ext>
+            </a:extLst>
+          </p:cNvPr>
+          <p:cNvPicPr>
+            <a:picLocks noChangeAspect="1"/>
+          </p:cNvPicPr>
+          <p:nvPr/>
+        </p:nvPicPr>
+        <p:blipFill>
+          <a:blip r:embed="rId11"/>
+          <a:stretch>
+            <a:fillRect/>
+          </a:stretch>
+        </p:blipFill>
+        <p:spPr>
+          <a:xfrm>
+            <a:off x="10056552" y="1663255"/>
+            <a:ext cx="1929444" cy="1929443"/>
+          </a:xfrm>
+          <a:prstGeom prst="rect">
+            <a:avLst/>
+          </a:prstGeom>
+          <a:ln>
+            <a:noFill/>
+          </a:ln>
+          <a:effectLst>
+            <a:outerShdw blurRad="190500" algn="tl" rotWithShape="0">
+              <a:srgbClr val="000000">
+                <a:alpha val="70000"/>
+              </a:srgbClr>
+            </a:outerShdw>
+          </a:effectLst>
         </p:spPr>
       </p:pic>
       <p:sp>
@@ -16224,7 +16920,7 @@
           <p:nvPr/>
         </p:nvPicPr>
         <p:blipFill>
-          <a:blip r:embed="rId8"/>
+          <a:blip r:embed="rId12"/>
           <a:stretch>
             <a:fillRect/>
           </a:stretch>
@@ -16357,13 +17053,13 @@
   <p:clrMapOvr>
     <a:masterClrMapping/>
   </p:clrMapOvr>
-  <mc:AlternateContent xmlns:mc="http://schemas.openxmlformats.org/markup-compatibility/2006">
-    <mc:Choice xmlns:p159="http://schemas.microsoft.com/office/powerpoint/2015/09/main" Requires="p159">
+  <mc:AlternateContent xmlns:mc="http://schemas.openxmlformats.org/markup-compatibility/2006" xmlns:p159="http://schemas.microsoft.com/office/powerpoint/2015/09/main">
+    <mc:Choice Requires="p159">
       <p:transition xmlns:p14="http://schemas.microsoft.com/office/powerpoint/2010/main" spd="slow" p14:dur="2000">
         <p159:morph option="byObject"/>
       </p:transition>
     </mc:Choice>
-    <mc:Fallback>
+    <mc:Fallback xmlns="">
       <p:transition spd="slow">
         <p:fade/>
       </p:transition>

</xml_diff>